<commit_message>
Add presentation and supporting materials for Gmail and Google Apps course
</commit_message>
<xml_diff>
--- a/Gmail e Google App.pptx
+++ b/Gmail e Google App.pptx
@@ -28,7 +28,7 @@
     <p:sldId id="275" r:id="rId23"/>
   </p:sldIdLst>
   <p:sldSz cx="9144000" cy="5143500"/>
-  <p:notesSz cx="6858000" cy="9144000"/>
+  <p:notesSz cx="7559675" cy="10691813"/>
 </p:presentation>
 </file>
 
@@ -63,7 +63,7 @@
         <p:txBody>
           <a:bodyPr/>
           <a:p>
-            <a:fld id="{B4FA48C8-0EEC-4FC3-AED0-A4B3E14D9296}" type="slidenum">
+            <a:fld id="{15EA5D74-842E-4841-9056-326B0438274A}" type="slidenum">
               <a:t>&lt;#&gt;</a:t>
             </a:fld>
           </a:p>
@@ -104,7 +104,7 @@
         <p:spPr>
           <a:xfrm>
             <a:off x="471960" y="738720"/>
-            <a:ext cx="8221680" cy="767160"/>
+            <a:ext cx="8221320" cy="766800"/>
           </a:xfrm>
           <a:prstGeom prst="rect">
             <a:avLst/>
@@ -119,10 +119,10 @@
             <a:noAutofit/>
           </a:bodyPr>
           <a:p>
-            <a:pPr indent="0">
-              <a:buNone/>
-            </a:pPr>
-            <a:endParaRPr b="0" lang="it-IT" sz="1400" spc="-1" strike="noStrike">
+            <a:pPr indent="0" algn="ctr">
+              <a:buNone/>
+            </a:pPr>
+            <a:endParaRPr b="0" lang="it-IT" sz="4400" spc="-1" strike="noStrike">
               <a:solidFill>
                 <a:srgbClr val="000000"/>
               </a:solidFill>
@@ -144,7 +144,7 @@
         <p:spPr>
           <a:xfrm>
             <a:off x="471960" y="1919160"/>
-            <a:ext cx="8221680" cy="1292400"/>
+            <a:ext cx="8221320" cy="1292040"/>
           </a:xfrm>
           <a:prstGeom prst="rect">
             <a:avLst/>
@@ -165,7 +165,7 @@
               </a:spcBef>
               <a:buNone/>
             </a:pPr>
-            <a:endParaRPr b="0" lang="it-IT" sz="1400" spc="-1" strike="noStrike">
+            <a:endParaRPr b="0" lang="it-IT" sz="3200" spc="-1" strike="noStrike">
               <a:solidFill>
                 <a:srgbClr val="000000"/>
               </a:solidFill>
@@ -186,8 +186,8 @@
         </p:nvSpPr>
         <p:spPr>
           <a:xfrm>
-            <a:off x="471960" y="3334680"/>
-            <a:ext cx="8221680" cy="1292400"/>
+            <a:off x="471960" y="3334320"/>
+            <a:ext cx="8221320" cy="1292040"/>
           </a:xfrm>
           <a:prstGeom prst="rect">
             <a:avLst/>
@@ -208,7 +208,7 @@
               </a:spcBef>
               <a:buNone/>
             </a:pPr>
-            <a:endParaRPr b="0" lang="it-IT" sz="1400" spc="-1" strike="noStrike">
+            <a:endParaRPr b="0" lang="it-IT" sz="3200" spc="-1" strike="noStrike">
               <a:solidFill>
                 <a:srgbClr val="000000"/>
               </a:solidFill>
@@ -231,7 +231,7 @@
         <p:txBody>
           <a:bodyPr/>
           <a:p>
-            <a:fld id="{D9B207AD-7231-47A8-A982-2B698BCE2364}" type="slidenum">
+            <a:fld id="{B06DE94E-B042-4981-A3AA-4606A8CB255B}" type="slidenum">
               <a:t>&lt;#&gt;</a:t>
             </a:fld>
           </a:p>
@@ -272,7 +272,7 @@
         <p:spPr>
           <a:xfrm>
             <a:off x="471960" y="738720"/>
-            <a:ext cx="8221680" cy="767160"/>
+            <a:ext cx="8221320" cy="766800"/>
           </a:xfrm>
           <a:prstGeom prst="rect">
             <a:avLst/>
@@ -287,10 +287,10 @@
             <a:noAutofit/>
           </a:bodyPr>
           <a:p>
-            <a:pPr indent="0">
-              <a:buNone/>
-            </a:pPr>
-            <a:endParaRPr b="0" lang="it-IT" sz="1400" spc="-1" strike="noStrike">
+            <a:pPr indent="0" algn="ctr">
+              <a:buNone/>
+            </a:pPr>
+            <a:endParaRPr b="0" lang="it-IT" sz="4400" spc="-1" strike="noStrike">
               <a:solidFill>
                 <a:srgbClr val="000000"/>
               </a:solidFill>
@@ -312,7 +312,7 @@
         <p:spPr>
           <a:xfrm>
             <a:off x="471960" y="1919160"/>
-            <a:ext cx="4011840" cy="1292400"/>
+            <a:ext cx="4011840" cy="1292040"/>
           </a:xfrm>
           <a:prstGeom prst="rect">
             <a:avLst/>
@@ -324,7 +324,7 @@
         </p:spPr>
         <p:txBody>
           <a:bodyPr lIns="0" rIns="0" tIns="0" bIns="0" anchor="t">
-            <a:normAutofit/>
+            <a:normAutofit fontScale="97000"/>
           </a:bodyPr>
           <a:p>
             <a:pPr indent="0">
@@ -333,7 +333,7 @@
               </a:spcBef>
               <a:buNone/>
             </a:pPr>
-            <a:endParaRPr b="0" lang="it-IT" sz="1400" spc="-1" strike="noStrike">
+            <a:endParaRPr b="0" lang="it-IT" sz="3200" spc="-1" strike="noStrike">
               <a:solidFill>
                 <a:srgbClr val="000000"/>
               </a:solidFill>
@@ -355,7 +355,7 @@
         <p:spPr>
           <a:xfrm>
             <a:off x="4684680" y="1919160"/>
-            <a:ext cx="4011840" cy="1292400"/>
+            <a:ext cx="4011840" cy="1292040"/>
           </a:xfrm>
           <a:prstGeom prst="rect">
             <a:avLst/>
@@ -367,7 +367,7 @@
         </p:spPr>
         <p:txBody>
           <a:bodyPr lIns="0" rIns="0" tIns="0" bIns="0" anchor="t">
-            <a:normAutofit/>
+            <a:normAutofit fontScale="97000"/>
           </a:bodyPr>
           <a:p>
             <a:pPr indent="0">
@@ -376,7 +376,7 @@
               </a:spcBef>
               <a:buNone/>
             </a:pPr>
-            <a:endParaRPr b="0" lang="it-IT" sz="1400" spc="-1" strike="noStrike">
+            <a:endParaRPr b="0" lang="it-IT" sz="3200" spc="-1" strike="noStrike">
               <a:solidFill>
                 <a:srgbClr val="000000"/>
               </a:solidFill>
@@ -397,8 +397,8 @@
         </p:nvSpPr>
         <p:spPr>
           <a:xfrm>
-            <a:off x="471960" y="3334680"/>
-            <a:ext cx="4011840" cy="1292400"/>
+            <a:off x="471960" y="3334320"/>
+            <a:ext cx="4011840" cy="1292040"/>
           </a:xfrm>
           <a:prstGeom prst="rect">
             <a:avLst/>
@@ -410,7 +410,7 @@
         </p:spPr>
         <p:txBody>
           <a:bodyPr lIns="0" rIns="0" tIns="0" bIns="0" anchor="t">
-            <a:normAutofit/>
+            <a:normAutofit fontScale="97000"/>
           </a:bodyPr>
           <a:p>
             <a:pPr indent="0">
@@ -419,7 +419,7 @@
               </a:spcBef>
               <a:buNone/>
             </a:pPr>
-            <a:endParaRPr b="0" lang="it-IT" sz="1400" spc="-1" strike="noStrike">
+            <a:endParaRPr b="0" lang="it-IT" sz="3200" spc="-1" strike="noStrike">
               <a:solidFill>
                 <a:srgbClr val="000000"/>
               </a:solidFill>
@@ -440,8 +440,8 @@
         </p:nvSpPr>
         <p:spPr>
           <a:xfrm>
-            <a:off x="4684680" y="3334680"/>
-            <a:ext cx="4011840" cy="1292400"/>
+            <a:off x="4684680" y="3334320"/>
+            <a:ext cx="4011840" cy="1292040"/>
           </a:xfrm>
           <a:prstGeom prst="rect">
             <a:avLst/>
@@ -453,7 +453,7 @@
         </p:spPr>
         <p:txBody>
           <a:bodyPr lIns="0" rIns="0" tIns="0" bIns="0" anchor="t">
-            <a:normAutofit/>
+            <a:normAutofit fontScale="97000"/>
           </a:bodyPr>
           <a:p>
             <a:pPr indent="0">
@@ -462,7 +462,7 @@
               </a:spcBef>
               <a:buNone/>
             </a:pPr>
-            <a:endParaRPr b="0" lang="it-IT" sz="1400" spc="-1" strike="noStrike">
+            <a:endParaRPr b="0" lang="it-IT" sz="3200" spc="-1" strike="noStrike">
               <a:solidFill>
                 <a:srgbClr val="000000"/>
               </a:solidFill>
@@ -485,7 +485,7 @@
         <p:txBody>
           <a:bodyPr/>
           <a:p>
-            <a:fld id="{8B068BD7-86D2-4DD6-A9B5-130DD1873782}" type="slidenum">
+            <a:fld id="{3163D7BE-9BF9-4D58-8B9C-B1201F981EF2}" type="slidenum">
               <a:t>&lt;#&gt;</a:t>
             </a:fld>
           </a:p>
@@ -526,7 +526,7 @@
         <p:spPr>
           <a:xfrm>
             <a:off x="471960" y="738720"/>
-            <a:ext cx="8221680" cy="767160"/>
+            <a:ext cx="8221320" cy="766800"/>
           </a:xfrm>
           <a:prstGeom prst="rect">
             <a:avLst/>
@@ -541,10 +541,10 @@
             <a:noAutofit/>
           </a:bodyPr>
           <a:p>
-            <a:pPr indent="0">
-              <a:buNone/>
-            </a:pPr>
-            <a:endParaRPr b="0" lang="it-IT" sz="1400" spc="-1" strike="noStrike">
+            <a:pPr indent="0" algn="ctr">
+              <a:buNone/>
+            </a:pPr>
+            <a:endParaRPr b="0" lang="it-IT" sz="4400" spc="-1" strike="noStrike">
               <a:solidFill>
                 <a:srgbClr val="000000"/>
               </a:solidFill>
@@ -566,7 +566,7 @@
         <p:spPr>
           <a:xfrm>
             <a:off x="471960" y="1919160"/>
-            <a:ext cx="2647080" cy="1292400"/>
+            <a:ext cx="2647080" cy="1292040"/>
           </a:xfrm>
           <a:prstGeom prst="rect">
             <a:avLst/>
@@ -578,7 +578,7 @@
         </p:spPr>
         <p:txBody>
           <a:bodyPr lIns="0" rIns="0" tIns="0" bIns="0" anchor="t">
-            <a:normAutofit/>
+            <a:normAutofit fontScale="94000"/>
           </a:bodyPr>
           <a:p>
             <a:pPr indent="0">
@@ -587,7 +587,7 @@
               </a:spcBef>
               <a:buNone/>
             </a:pPr>
-            <a:endParaRPr b="0" lang="it-IT" sz="1400" spc="-1" strike="noStrike">
+            <a:endParaRPr b="0" lang="it-IT" sz="3200" spc="-1" strike="noStrike">
               <a:solidFill>
                 <a:srgbClr val="000000"/>
               </a:solidFill>
@@ -609,7 +609,7 @@
         <p:spPr>
           <a:xfrm>
             <a:off x="3251880" y="1919160"/>
-            <a:ext cx="2647080" cy="1292400"/>
+            <a:ext cx="2647080" cy="1292040"/>
           </a:xfrm>
           <a:prstGeom prst="rect">
             <a:avLst/>
@@ -621,7 +621,7 @@
         </p:spPr>
         <p:txBody>
           <a:bodyPr lIns="0" rIns="0" tIns="0" bIns="0" anchor="t">
-            <a:normAutofit/>
+            <a:normAutofit fontScale="94000"/>
           </a:bodyPr>
           <a:p>
             <a:pPr indent="0">
@@ -630,7 +630,7 @@
               </a:spcBef>
               <a:buNone/>
             </a:pPr>
-            <a:endParaRPr b="0" lang="it-IT" sz="1400" spc="-1" strike="noStrike">
+            <a:endParaRPr b="0" lang="it-IT" sz="3200" spc="-1" strike="noStrike">
               <a:solidFill>
                 <a:srgbClr val="000000"/>
               </a:solidFill>
@@ -652,7 +652,7 @@
         <p:spPr>
           <a:xfrm>
             <a:off x="6031440" y="1919160"/>
-            <a:ext cx="2647080" cy="1292400"/>
+            <a:ext cx="2647080" cy="1292040"/>
           </a:xfrm>
           <a:prstGeom prst="rect">
             <a:avLst/>
@@ -664,7 +664,7 @@
         </p:spPr>
         <p:txBody>
           <a:bodyPr lIns="0" rIns="0" tIns="0" bIns="0" anchor="t">
-            <a:normAutofit/>
+            <a:normAutofit fontScale="94000"/>
           </a:bodyPr>
           <a:p>
             <a:pPr indent="0">
@@ -673,7 +673,7 @@
               </a:spcBef>
               <a:buNone/>
             </a:pPr>
-            <a:endParaRPr b="0" lang="it-IT" sz="1400" spc="-1" strike="noStrike">
+            <a:endParaRPr b="0" lang="it-IT" sz="3200" spc="-1" strike="noStrike">
               <a:solidFill>
                 <a:srgbClr val="000000"/>
               </a:solidFill>
@@ -694,8 +694,8 @@
         </p:nvSpPr>
         <p:spPr>
           <a:xfrm>
-            <a:off x="471960" y="3334680"/>
-            <a:ext cx="2647080" cy="1292400"/>
+            <a:off x="471960" y="3334320"/>
+            <a:ext cx="2647080" cy="1292040"/>
           </a:xfrm>
           <a:prstGeom prst="rect">
             <a:avLst/>
@@ -707,7 +707,7 @@
         </p:spPr>
         <p:txBody>
           <a:bodyPr lIns="0" rIns="0" tIns="0" bIns="0" anchor="t">
-            <a:normAutofit/>
+            <a:normAutofit fontScale="94000"/>
           </a:bodyPr>
           <a:p>
             <a:pPr indent="0">
@@ -716,7 +716,7 @@
               </a:spcBef>
               <a:buNone/>
             </a:pPr>
-            <a:endParaRPr b="0" lang="it-IT" sz="1400" spc="-1" strike="noStrike">
+            <a:endParaRPr b="0" lang="it-IT" sz="3200" spc="-1" strike="noStrike">
               <a:solidFill>
                 <a:srgbClr val="000000"/>
               </a:solidFill>
@@ -737,8 +737,8 @@
         </p:nvSpPr>
         <p:spPr>
           <a:xfrm>
-            <a:off x="3251880" y="3334680"/>
-            <a:ext cx="2647080" cy="1292400"/>
+            <a:off x="3251880" y="3334320"/>
+            <a:ext cx="2647080" cy="1292040"/>
           </a:xfrm>
           <a:prstGeom prst="rect">
             <a:avLst/>
@@ -750,7 +750,7 @@
         </p:spPr>
         <p:txBody>
           <a:bodyPr lIns="0" rIns="0" tIns="0" bIns="0" anchor="t">
-            <a:normAutofit/>
+            <a:normAutofit fontScale="94000"/>
           </a:bodyPr>
           <a:p>
             <a:pPr indent="0">
@@ -759,7 +759,7 @@
               </a:spcBef>
               <a:buNone/>
             </a:pPr>
-            <a:endParaRPr b="0" lang="it-IT" sz="1400" spc="-1" strike="noStrike">
+            <a:endParaRPr b="0" lang="it-IT" sz="3200" spc="-1" strike="noStrike">
               <a:solidFill>
                 <a:srgbClr val="000000"/>
               </a:solidFill>
@@ -780,8 +780,8 @@
         </p:nvSpPr>
         <p:spPr>
           <a:xfrm>
-            <a:off x="6031440" y="3334680"/>
-            <a:ext cx="2647080" cy="1292400"/>
+            <a:off x="6031440" y="3334320"/>
+            <a:ext cx="2647080" cy="1292040"/>
           </a:xfrm>
           <a:prstGeom prst="rect">
             <a:avLst/>
@@ -793,7 +793,7 @@
         </p:spPr>
         <p:txBody>
           <a:bodyPr lIns="0" rIns="0" tIns="0" bIns="0" anchor="t">
-            <a:normAutofit/>
+            <a:normAutofit fontScale="94000"/>
           </a:bodyPr>
           <a:p>
             <a:pPr indent="0">
@@ -802,7 +802,7 @@
               </a:spcBef>
               <a:buNone/>
             </a:pPr>
-            <a:endParaRPr b="0" lang="it-IT" sz="1400" spc="-1" strike="noStrike">
+            <a:endParaRPr b="0" lang="it-IT" sz="3200" spc="-1" strike="noStrike">
               <a:solidFill>
                 <a:srgbClr val="000000"/>
               </a:solidFill>
@@ -825,7 +825,7 @@
         <p:txBody>
           <a:bodyPr/>
           <a:p>
-            <a:fld id="{BADCB967-76E8-4029-95C3-16515BC8271E}" type="slidenum">
+            <a:fld id="{3B466B82-55E8-42D0-B56A-287AB214624E}" type="slidenum">
               <a:t>&lt;#&gt;</a:t>
             </a:fld>
           </a:p>
@@ -867,7 +867,7 @@
         <p:txBody>
           <a:bodyPr/>
           <a:p>
-            <a:fld id="{AD6DFECB-8C06-461C-94F2-CA30BE0C4DF9}" type="slidenum">
+            <a:fld id="{F32DDD41-7408-4571-842C-97525E03B11B}" type="slidenum">
               <a:t>&lt;#&gt;</a:t>
             </a:fld>
           </a:p>
@@ -908,7 +908,7 @@
         <p:spPr>
           <a:xfrm>
             <a:off x="471960" y="738720"/>
-            <a:ext cx="8221680" cy="767160"/>
+            <a:ext cx="8221320" cy="766800"/>
           </a:xfrm>
           <a:prstGeom prst="rect">
             <a:avLst/>
@@ -923,10 +923,10 @@
             <a:noAutofit/>
           </a:bodyPr>
           <a:p>
-            <a:pPr indent="0">
-              <a:buNone/>
-            </a:pPr>
-            <a:endParaRPr b="0" lang="it-IT" sz="1400" spc="-1" strike="noStrike">
+            <a:pPr indent="0" algn="ctr">
+              <a:buNone/>
+            </a:pPr>
+            <a:endParaRPr b="0" lang="it-IT" sz="4400" spc="-1" strike="noStrike">
               <a:solidFill>
                 <a:srgbClr val="000000"/>
               </a:solidFill>
@@ -948,7 +948,7 @@
         <p:spPr>
           <a:xfrm>
             <a:off x="471960" y="1919160"/>
-            <a:ext cx="8221680" cy="2709720"/>
+            <a:ext cx="8221320" cy="2709360"/>
           </a:xfrm>
           <a:prstGeom prst="rect">
             <a:avLst/>
@@ -989,7 +989,7 @@
         <p:txBody>
           <a:bodyPr/>
           <a:p>
-            <a:fld id="{9D575A8E-A004-4F9C-8005-C192A7E16270}" type="slidenum">
+            <a:fld id="{8A5D2D44-744D-4945-97EA-62E6CB401A23}" type="slidenum">
               <a:t>&lt;#&gt;</a:t>
             </a:fld>
           </a:p>
@@ -1030,7 +1030,7 @@
         <p:spPr>
           <a:xfrm>
             <a:off x="471960" y="738720"/>
-            <a:ext cx="8221680" cy="767160"/>
+            <a:ext cx="8221320" cy="766800"/>
           </a:xfrm>
           <a:prstGeom prst="rect">
             <a:avLst/>
@@ -1045,10 +1045,10 @@
             <a:noAutofit/>
           </a:bodyPr>
           <a:p>
-            <a:pPr indent="0">
-              <a:buNone/>
-            </a:pPr>
-            <a:endParaRPr b="0" lang="it-IT" sz="1400" spc="-1" strike="noStrike">
+            <a:pPr indent="0" algn="ctr">
+              <a:buNone/>
+            </a:pPr>
+            <a:endParaRPr b="0" lang="it-IT" sz="4400" spc="-1" strike="noStrike">
               <a:solidFill>
                 <a:srgbClr val="000000"/>
               </a:solidFill>
@@ -1070,7 +1070,7 @@
         <p:spPr>
           <a:xfrm>
             <a:off x="471960" y="1919160"/>
-            <a:ext cx="8221680" cy="2709720"/>
+            <a:ext cx="8221320" cy="2709360"/>
           </a:xfrm>
           <a:prstGeom prst="rect">
             <a:avLst/>
@@ -1091,7 +1091,7 @@
               </a:spcBef>
               <a:buNone/>
             </a:pPr>
-            <a:endParaRPr b="0" lang="it-IT" sz="1400" spc="-1" strike="noStrike">
+            <a:endParaRPr b="0" lang="it-IT" sz="3200" spc="-1" strike="noStrike">
               <a:solidFill>
                 <a:srgbClr val="000000"/>
               </a:solidFill>
@@ -1114,7 +1114,7 @@
         <p:txBody>
           <a:bodyPr/>
           <a:p>
-            <a:fld id="{CDD35FD0-4BE5-4FF6-9DA2-0E76F286B4F1}" type="slidenum">
+            <a:fld id="{5D4CCB5F-7A76-43B5-AD1A-1FB8337D4AD2}" type="slidenum">
               <a:t>&lt;#&gt;</a:t>
             </a:fld>
           </a:p>
@@ -1155,7 +1155,7 @@
         <p:spPr>
           <a:xfrm>
             <a:off x="471960" y="738720"/>
-            <a:ext cx="8221680" cy="767160"/>
+            <a:ext cx="8221320" cy="766800"/>
           </a:xfrm>
           <a:prstGeom prst="rect">
             <a:avLst/>
@@ -1170,10 +1170,10 @@
             <a:noAutofit/>
           </a:bodyPr>
           <a:p>
-            <a:pPr indent="0">
-              <a:buNone/>
-            </a:pPr>
-            <a:endParaRPr b="0" lang="it-IT" sz="1400" spc="-1" strike="noStrike">
+            <a:pPr indent="0" algn="ctr">
+              <a:buNone/>
+            </a:pPr>
+            <a:endParaRPr b="0" lang="it-IT" sz="4400" spc="-1" strike="noStrike">
               <a:solidFill>
                 <a:srgbClr val="000000"/>
               </a:solidFill>
@@ -1195,7 +1195,7 @@
         <p:spPr>
           <a:xfrm>
             <a:off x="471960" y="1919160"/>
-            <a:ext cx="4011840" cy="2709720"/>
+            <a:ext cx="4011840" cy="2709360"/>
           </a:xfrm>
           <a:prstGeom prst="rect">
             <a:avLst/>
@@ -1216,7 +1216,7 @@
               </a:spcBef>
               <a:buNone/>
             </a:pPr>
-            <a:endParaRPr b="0" lang="it-IT" sz="1400" spc="-1" strike="noStrike">
+            <a:endParaRPr b="0" lang="it-IT" sz="3200" spc="-1" strike="noStrike">
               <a:solidFill>
                 <a:srgbClr val="000000"/>
               </a:solidFill>
@@ -1238,7 +1238,7 @@
         <p:spPr>
           <a:xfrm>
             <a:off x="4684680" y="1919160"/>
-            <a:ext cx="4011840" cy="2709720"/>
+            <a:ext cx="4011840" cy="2709360"/>
           </a:xfrm>
           <a:prstGeom prst="rect">
             <a:avLst/>
@@ -1259,7 +1259,7 @@
               </a:spcBef>
               <a:buNone/>
             </a:pPr>
-            <a:endParaRPr b="0" lang="it-IT" sz="1400" spc="-1" strike="noStrike">
+            <a:endParaRPr b="0" lang="it-IT" sz="3200" spc="-1" strike="noStrike">
               <a:solidFill>
                 <a:srgbClr val="000000"/>
               </a:solidFill>
@@ -1282,7 +1282,7 @@
         <p:txBody>
           <a:bodyPr/>
           <a:p>
-            <a:fld id="{C179AA5A-DE6A-44C8-AC9C-24F00F7E1D84}" type="slidenum">
+            <a:fld id="{7B72B9AA-68AA-47F8-8CEC-4DAE51F1FB49}" type="slidenum">
               <a:t>&lt;#&gt;</a:t>
             </a:fld>
           </a:p>
@@ -1323,7 +1323,7 @@
         <p:spPr>
           <a:xfrm>
             <a:off x="471960" y="738720"/>
-            <a:ext cx="8221680" cy="767160"/>
+            <a:ext cx="8221320" cy="766800"/>
           </a:xfrm>
           <a:prstGeom prst="rect">
             <a:avLst/>
@@ -1338,10 +1338,10 @@
             <a:noAutofit/>
           </a:bodyPr>
           <a:p>
-            <a:pPr indent="0">
-              <a:buNone/>
-            </a:pPr>
-            <a:endParaRPr b="0" lang="it-IT" sz="1400" spc="-1" strike="noStrike">
+            <a:pPr indent="0" algn="ctr">
+              <a:buNone/>
+            </a:pPr>
+            <a:endParaRPr b="0" lang="it-IT" sz="4400" spc="-1" strike="noStrike">
               <a:solidFill>
                 <a:srgbClr val="000000"/>
               </a:solidFill>
@@ -1364,7 +1364,7 @@
         <p:txBody>
           <a:bodyPr/>
           <a:p>
-            <a:fld id="{999F8223-81A5-4012-87AF-B15A28878AEE}" type="slidenum">
+            <a:fld id="{B5FFA3D7-5000-4381-BE6E-0B90E0AFA27D}" type="slidenum">
               <a:t>&lt;#&gt;</a:t>
             </a:fld>
           </a:p>
@@ -1405,7 +1405,7 @@
         <p:spPr>
           <a:xfrm>
             <a:off x="471960" y="738720"/>
-            <a:ext cx="8221680" cy="3557520"/>
+            <a:ext cx="8221320" cy="3555720"/>
           </a:xfrm>
           <a:prstGeom prst="rect">
             <a:avLst/>
@@ -1444,7 +1444,7 @@
         <p:txBody>
           <a:bodyPr/>
           <a:p>
-            <a:fld id="{9BC3FDD9-FF63-49AF-85D6-25CD0AC10247}" type="slidenum">
+            <a:fld id="{4309F1C9-0395-4605-A926-490CCC02614B}" type="slidenum">
               <a:t>&lt;#&gt;</a:t>
             </a:fld>
           </a:p>
@@ -1485,7 +1485,7 @@
         <p:spPr>
           <a:xfrm>
             <a:off x="471960" y="738720"/>
-            <a:ext cx="8221680" cy="767160"/>
+            <a:ext cx="8221320" cy="766800"/>
           </a:xfrm>
           <a:prstGeom prst="rect">
             <a:avLst/>
@@ -1500,10 +1500,10 @@
             <a:noAutofit/>
           </a:bodyPr>
           <a:p>
-            <a:pPr indent="0">
-              <a:buNone/>
-            </a:pPr>
-            <a:endParaRPr b="0" lang="it-IT" sz="1400" spc="-1" strike="noStrike">
+            <a:pPr indent="0" algn="ctr">
+              <a:buNone/>
+            </a:pPr>
+            <a:endParaRPr b="0" lang="it-IT" sz="4400" spc="-1" strike="noStrike">
               <a:solidFill>
                 <a:srgbClr val="000000"/>
               </a:solidFill>
@@ -1525,7 +1525,7 @@
         <p:spPr>
           <a:xfrm>
             <a:off x="471960" y="1919160"/>
-            <a:ext cx="4011840" cy="1292400"/>
+            <a:ext cx="4011840" cy="1292040"/>
           </a:xfrm>
           <a:prstGeom prst="rect">
             <a:avLst/>
@@ -1537,7 +1537,7 @@
         </p:spPr>
         <p:txBody>
           <a:bodyPr lIns="0" rIns="0" tIns="0" bIns="0" anchor="t">
-            <a:normAutofit/>
+            <a:normAutofit fontScale="97000"/>
           </a:bodyPr>
           <a:p>
             <a:pPr indent="0">
@@ -1546,7 +1546,7 @@
               </a:spcBef>
               <a:buNone/>
             </a:pPr>
-            <a:endParaRPr b="0" lang="it-IT" sz="1400" spc="-1" strike="noStrike">
+            <a:endParaRPr b="0" lang="it-IT" sz="3200" spc="-1" strike="noStrike">
               <a:solidFill>
                 <a:srgbClr val="000000"/>
               </a:solidFill>
@@ -1568,7 +1568,7 @@
         <p:spPr>
           <a:xfrm>
             <a:off x="4684680" y="1919160"/>
-            <a:ext cx="4011840" cy="2709720"/>
+            <a:ext cx="4011840" cy="2709360"/>
           </a:xfrm>
           <a:prstGeom prst="rect">
             <a:avLst/>
@@ -1589,7 +1589,7 @@
               </a:spcBef>
               <a:buNone/>
             </a:pPr>
-            <a:endParaRPr b="0" lang="it-IT" sz="1400" spc="-1" strike="noStrike">
+            <a:endParaRPr b="0" lang="it-IT" sz="3200" spc="-1" strike="noStrike">
               <a:solidFill>
                 <a:srgbClr val="000000"/>
               </a:solidFill>
@@ -1610,8 +1610,8 @@
         </p:nvSpPr>
         <p:spPr>
           <a:xfrm>
-            <a:off x="471960" y="3334680"/>
-            <a:ext cx="4011840" cy="1292400"/>
+            <a:off x="471960" y="3334320"/>
+            <a:ext cx="4011840" cy="1292040"/>
           </a:xfrm>
           <a:prstGeom prst="rect">
             <a:avLst/>
@@ -1623,7 +1623,7 @@
         </p:spPr>
         <p:txBody>
           <a:bodyPr lIns="0" rIns="0" tIns="0" bIns="0" anchor="t">
-            <a:normAutofit/>
+            <a:normAutofit fontScale="97000"/>
           </a:bodyPr>
           <a:p>
             <a:pPr indent="0">
@@ -1632,7 +1632,7 @@
               </a:spcBef>
               <a:buNone/>
             </a:pPr>
-            <a:endParaRPr b="0" lang="it-IT" sz="1400" spc="-1" strike="noStrike">
+            <a:endParaRPr b="0" lang="it-IT" sz="3200" spc="-1" strike="noStrike">
               <a:solidFill>
                 <a:srgbClr val="000000"/>
               </a:solidFill>
@@ -1655,7 +1655,7 @@
         <p:txBody>
           <a:bodyPr/>
           <a:p>
-            <a:fld id="{7110897B-F281-4FA1-9A5D-E80E20557D42}" type="slidenum">
+            <a:fld id="{D604901C-B5AC-4CBC-94F1-6556CC170723}" type="slidenum">
               <a:t>&lt;#&gt;</a:t>
             </a:fld>
           </a:p>
@@ -1696,7 +1696,7 @@
         <p:spPr>
           <a:xfrm>
             <a:off x="471960" y="738720"/>
-            <a:ext cx="8221680" cy="767160"/>
+            <a:ext cx="8221320" cy="766800"/>
           </a:xfrm>
           <a:prstGeom prst="rect">
             <a:avLst/>
@@ -1711,10 +1711,10 @@
             <a:noAutofit/>
           </a:bodyPr>
           <a:p>
-            <a:pPr indent="0">
-              <a:buNone/>
-            </a:pPr>
-            <a:endParaRPr b="0" lang="it-IT" sz="1400" spc="-1" strike="noStrike">
+            <a:pPr indent="0" algn="ctr">
+              <a:buNone/>
+            </a:pPr>
+            <a:endParaRPr b="0" lang="it-IT" sz="4400" spc="-1" strike="noStrike">
               <a:solidFill>
                 <a:srgbClr val="000000"/>
               </a:solidFill>
@@ -1736,7 +1736,7 @@
         <p:spPr>
           <a:xfrm>
             <a:off x="471960" y="1919160"/>
-            <a:ext cx="8221680" cy="2709720"/>
+            <a:ext cx="8221320" cy="2709360"/>
           </a:xfrm>
           <a:prstGeom prst="rect">
             <a:avLst/>
@@ -1777,7 +1777,7 @@
         <p:txBody>
           <a:bodyPr/>
           <a:p>
-            <a:fld id="{8A237A7A-A151-4E7C-9B83-13017726D0E8}" type="slidenum">
+            <a:fld id="{30D0E63D-8D24-4A26-BD0F-B37847BAA3A1}" type="slidenum">
               <a:t>&lt;#&gt;</a:t>
             </a:fld>
           </a:p>
@@ -1818,7 +1818,7 @@
         <p:spPr>
           <a:xfrm>
             <a:off x="471960" y="738720"/>
-            <a:ext cx="8221680" cy="767160"/>
+            <a:ext cx="8221320" cy="766800"/>
           </a:xfrm>
           <a:prstGeom prst="rect">
             <a:avLst/>
@@ -1833,10 +1833,10 @@
             <a:noAutofit/>
           </a:bodyPr>
           <a:p>
-            <a:pPr indent="0">
-              <a:buNone/>
-            </a:pPr>
-            <a:endParaRPr b="0" lang="it-IT" sz="1400" spc="-1" strike="noStrike">
+            <a:pPr indent="0" algn="ctr">
+              <a:buNone/>
+            </a:pPr>
+            <a:endParaRPr b="0" lang="it-IT" sz="4400" spc="-1" strike="noStrike">
               <a:solidFill>
                 <a:srgbClr val="000000"/>
               </a:solidFill>
@@ -1858,7 +1858,7 @@
         <p:spPr>
           <a:xfrm>
             <a:off x="471960" y="1919160"/>
-            <a:ext cx="4011840" cy="2709720"/>
+            <a:ext cx="4011840" cy="2709360"/>
           </a:xfrm>
           <a:prstGeom prst="rect">
             <a:avLst/>
@@ -1879,7 +1879,7 @@
               </a:spcBef>
               <a:buNone/>
             </a:pPr>
-            <a:endParaRPr b="0" lang="it-IT" sz="1400" spc="-1" strike="noStrike">
+            <a:endParaRPr b="0" lang="it-IT" sz="3200" spc="-1" strike="noStrike">
               <a:solidFill>
                 <a:srgbClr val="000000"/>
               </a:solidFill>
@@ -1901,7 +1901,7 @@
         <p:spPr>
           <a:xfrm>
             <a:off x="4684680" y="1919160"/>
-            <a:ext cx="4011840" cy="1292400"/>
+            <a:ext cx="4011840" cy="1292040"/>
           </a:xfrm>
           <a:prstGeom prst="rect">
             <a:avLst/>
@@ -1913,7 +1913,7 @@
         </p:spPr>
         <p:txBody>
           <a:bodyPr lIns="0" rIns="0" tIns="0" bIns="0" anchor="t">
-            <a:normAutofit/>
+            <a:normAutofit fontScale="97000"/>
           </a:bodyPr>
           <a:p>
             <a:pPr indent="0">
@@ -1922,7 +1922,7 @@
               </a:spcBef>
               <a:buNone/>
             </a:pPr>
-            <a:endParaRPr b="0" lang="it-IT" sz="1400" spc="-1" strike="noStrike">
+            <a:endParaRPr b="0" lang="it-IT" sz="3200" spc="-1" strike="noStrike">
               <a:solidFill>
                 <a:srgbClr val="000000"/>
               </a:solidFill>
@@ -1943,8 +1943,8 @@
         </p:nvSpPr>
         <p:spPr>
           <a:xfrm>
-            <a:off x="4684680" y="3334680"/>
-            <a:ext cx="4011840" cy="1292400"/>
+            <a:off x="4684680" y="3334320"/>
+            <a:ext cx="4011840" cy="1292040"/>
           </a:xfrm>
           <a:prstGeom prst="rect">
             <a:avLst/>
@@ -1956,7 +1956,7 @@
         </p:spPr>
         <p:txBody>
           <a:bodyPr lIns="0" rIns="0" tIns="0" bIns="0" anchor="t">
-            <a:normAutofit/>
+            <a:normAutofit fontScale="97000"/>
           </a:bodyPr>
           <a:p>
             <a:pPr indent="0">
@@ -1965,7 +1965,7 @@
               </a:spcBef>
               <a:buNone/>
             </a:pPr>
-            <a:endParaRPr b="0" lang="it-IT" sz="1400" spc="-1" strike="noStrike">
+            <a:endParaRPr b="0" lang="it-IT" sz="3200" spc="-1" strike="noStrike">
               <a:solidFill>
                 <a:srgbClr val="000000"/>
               </a:solidFill>
@@ -1988,7 +1988,7 @@
         <p:txBody>
           <a:bodyPr/>
           <a:p>
-            <a:fld id="{FE364160-0509-42F9-9B5B-FB7AC19F209B}" type="slidenum">
+            <a:fld id="{3F51C7E8-A5A4-444F-8077-3543105C8F62}" type="slidenum">
               <a:t>&lt;#&gt;</a:t>
             </a:fld>
           </a:p>
@@ -2029,7 +2029,7 @@
         <p:spPr>
           <a:xfrm>
             <a:off x="471960" y="738720"/>
-            <a:ext cx="8221680" cy="767160"/>
+            <a:ext cx="8221320" cy="766800"/>
           </a:xfrm>
           <a:prstGeom prst="rect">
             <a:avLst/>
@@ -2044,10 +2044,10 @@
             <a:noAutofit/>
           </a:bodyPr>
           <a:p>
-            <a:pPr indent="0">
-              <a:buNone/>
-            </a:pPr>
-            <a:endParaRPr b="0" lang="it-IT" sz="1400" spc="-1" strike="noStrike">
+            <a:pPr indent="0" algn="ctr">
+              <a:buNone/>
+            </a:pPr>
+            <a:endParaRPr b="0" lang="it-IT" sz="4400" spc="-1" strike="noStrike">
               <a:solidFill>
                 <a:srgbClr val="000000"/>
               </a:solidFill>
@@ -2069,7 +2069,7 @@
         <p:spPr>
           <a:xfrm>
             <a:off x="471960" y="1919160"/>
-            <a:ext cx="4011840" cy="1292400"/>
+            <a:ext cx="4011840" cy="1292040"/>
           </a:xfrm>
           <a:prstGeom prst="rect">
             <a:avLst/>
@@ -2081,7 +2081,7 @@
         </p:spPr>
         <p:txBody>
           <a:bodyPr lIns="0" rIns="0" tIns="0" bIns="0" anchor="t">
-            <a:normAutofit/>
+            <a:normAutofit fontScale="97000"/>
           </a:bodyPr>
           <a:p>
             <a:pPr indent="0">
@@ -2090,7 +2090,7 @@
               </a:spcBef>
               <a:buNone/>
             </a:pPr>
-            <a:endParaRPr b="0" lang="it-IT" sz="1400" spc="-1" strike="noStrike">
+            <a:endParaRPr b="0" lang="it-IT" sz="3200" spc="-1" strike="noStrike">
               <a:solidFill>
                 <a:srgbClr val="000000"/>
               </a:solidFill>
@@ -2112,7 +2112,7 @@
         <p:spPr>
           <a:xfrm>
             <a:off x="4684680" y="1919160"/>
-            <a:ext cx="4011840" cy="1292400"/>
+            <a:ext cx="4011840" cy="1292040"/>
           </a:xfrm>
           <a:prstGeom prst="rect">
             <a:avLst/>
@@ -2124,7 +2124,7 @@
         </p:spPr>
         <p:txBody>
           <a:bodyPr lIns="0" rIns="0" tIns="0" bIns="0" anchor="t">
-            <a:normAutofit/>
+            <a:normAutofit fontScale="97000"/>
           </a:bodyPr>
           <a:p>
             <a:pPr indent="0">
@@ -2133,7 +2133,7 @@
               </a:spcBef>
               <a:buNone/>
             </a:pPr>
-            <a:endParaRPr b="0" lang="it-IT" sz="1400" spc="-1" strike="noStrike">
+            <a:endParaRPr b="0" lang="it-IT" sz="3200" spc="-1" strike="noStrike">
               <a:solidFill>
                 <a:srgbClr val="000000"/>
               </a:solidFill>
@@ -2154,8 +2154,8 @@
         </p:nvSpPr>
         <p:spPr>
           <a:xfrm>
-            <a:off x="471960" y="3334680"/>
-            <a:ext cx="8221680" cy="1292400"/>
+            <a:off x="471960" y="3334320"/>
+            <a:ext cx="8221320" cy="1292040"/>
           </a:xfrm>
           <a:prstGeom prst="rect">
             <a:avLst/>
@@ -2176,7 +2176,7 @@
               </a:spcBef>
               <a:buNone/>
             </a:pPr>
-            <a:endParaRPr b="0" lang="it-IT" sz="1400" spc="-1" strike="noStrike">
+            <a:endParaRPr b="0" lang="it-IT" sz="3200" spc="-1" strike="noStrike">
               <a:solidFill>
                 <a:srgbClr val="000000"/>
               </a:solidFill>
@@ -2199,7 +2199,7 @@
         <p:txBody>
           <a:bodyPr/>
           <a:p>
-            <a:fld id="{5D18B0E1-4702-4B6C-9444-6B31FBDF9EA0}" type="slidenum">
+            <a:fld id="{34B0E9A2-09C2-4E78-A1F0-057595BE6A11}" type="slidenum">
               <a:t>&lt;#&gt;</a:t>
             </a:fld>
           </a:p>
@@ -2240,7 +2240,7 @@
         <p:spPr>
           <a:xfrm>
             <a:off x="471960" y="738720"/>
-            <a:ext cx="8221680" cy="767160"/>
+            <a:ext cx="8221320" cy="766800"/>
           </a:xfrm>
           <a:prstGeom prst="rect">
             <a:avLst/>
@@ -2255,10 +2255,10 @@
             <a:noAutofit/>
           </a:bodyPr>
           <a:p>
-            <a:pPr indent="0">
-              <a:buNone/>
-            </a:pPr>
-            <a:endParaRPr b="0" lang="it-IT" sz="1400" spc="-1" strike="noStrike">
+            <a:pPr indent="0" algn="ctr">
+              <a:buNone/>
+            </a:pPr>
+            <a:endParaRPr b="0" lang="it-IT" sz="4400" spc="-1" strike="noStrike">
               <a:solidFill>
                 <a:srgbClr val="000000"/>
               </a:solidFill>
@@ -2280,7 +2280,7 @@
         <p:spPr>
           <a:xfrm>
             <a:off x="471960" y="1919160"/>
-            <a:ext cx="8221680" cy="1292400"/>
+            <a:ext cx="8221320" cy="1292040"/>
           </a:xfrm>
           <a:prstGeom prst="rect">
             <a:avLst/>
@@ -2301,7 +2301,7 @@
               </a:spcBef>
               <a:buNone/>
             </a:pPr>
-            <a:endParaRPr b="0" lang="it-IT" sz="1400" spc="-1" strike="noStrike">
+            <a:endParaRPr b="0" lang="it-IT" sz="3200" spc="-1" strike="noStrike">
               <a:solidFill>
                 <a:srgbClr val="000000"/>
               </a:solidFill>
@@ -2322,8 +2322,8 @@
         </p:nvSpPr>
         <p:spPr>
           <a:xfrm>
-            <a:off x="471960" y="3334680"/>
-            <a:ext cx="8221680" cy="1292400"/>
+            <a:off x="471960" y="3334320"/>
+            <a:ext cx="8221320" cy="1292040"/>
           </a:xfrm>
           <a:prstGeom prst="rect">
             <a:avLst/>
@@ -2344,7 +2344,7 @@
               </a:spcBef>
               <a:buNone/>
             </a:pPr>
-            <a:endParaRPr b="0" lang="it-IT" sz="1400" spc="-1" strike="noStrike">
+            <a:endParaRPr b="0" lang="it-IT" sz="3200" spc="-1" strike="noStrike">
               <a:solidFill>
                 <a:srgbClr val="000000"/>
               </a:solidFill>
@@ -2367,7 +2367,7 @@
         <p:txBody>
           <a:bodyPr/>
           <a:p>
-            <a:fld id="{F86727A1-EA27-4B19-A3A7-552D9F115698}" type="slidenum">
+            <a:fld id="{1DD7EAAC-8FFC-45BC-A322-65022B2D366B}" type="slidenum">
               <a:t>&lt;#&gt;</a:t>
             </a:fld>
           </a:p>
@@ -2408,7 +2408,7 @@
         <p:spPr>
           <a:xfrm>
             <a:off x="471960" y="738720"/>
-            <a:ext cx="8221680" cy="767160"/>
+            <a:ext cx="8221320" cy="766800"/>
           </a:xfrm>
           <a:prstGeom prst="rect">
             <a:avLst/>
@@ -2423,10 +2423,10 @@
             <a:noAutofit/>
           </a:bodyPr>
           <a:p>
-            <a:pPr indent="0">
-              <a:buNone/>
-            </a:pPr>
-            <a:endParaRPr b="0" lang="it-IT" sz="1400" spc="-1" strike="noStrike">
+            <a:pPr indent="0" algn="ctr">
+              <a:buNone/>
+            </a:pPr>
+            <a:endParaRPr b="0" lang="it-IT" sz="4400" spc="-1" strike="noStrike">
               <a:solidFill>
                 <a:srgbClr val="000000"/>
               </a:solidFill>
@@ -2448,7 +2448,7 @@
         <p:spPr>
           <a:xfrm>
             <a:off x="471960" y="1919160"/>
-            <a:ext cx="4011840" cy="1292400"/>
+            <a:ext cx="4011840" cy="1292040"/>
           </a:xfrm>
           <a:prstGeom prst="rect">
             <a:avLst/>
@@ -2460,7 +2460,7 @@
         </p:spPr>
         <p:txBody>
           <a:bodyPr lIns="0" rIns="0" tIns="0" bIns="0" anchor="t">
-            <a:normAutofit/>
+            <a:normAutofit fontScale="97000"/>
           </a:bodyPr>
           <a:p>
             <a:pPr indent="0">
@@ -2469,7 +2469,7 @@
               </a:spcBef>
               <a:buNone/>
             </a:pPr>
-            <a:endParaRPr b="0" lang="it-IT" sz="1400" spc="-1" strike="noStrike">
+            <a:endParaRPr b="0" lang="it-IT" sz="3200" spc="-1" strike="noStrike">
               <a:solidFill>
                 <a:srgbClr val="000000"/>
               </a:solidFill>
@@ -2491,7 +2491,7 @@
         <p:spPr>
           <a:xfrm>
             <a:off x="4684680" y="1919160"/>
-            <a:ext cx="4011840" cy="1292400"/>
+            <a:ext cx="4011840" cy="1292040"/>
           </a:xfrm>
           <a:prstGeom prst="rect">
             <a:avLst/>
@@ -2503,7 +2503,7 @@
         </p:spPr>
         <p:txBody>
           <a:bodyPr lIns="0" rIns="0" tIns="0" bIns="0" anchor="t">
-            <a:normAutofit/>
+            <a:normAutofit fontScale="97000"/>
           </a:bodyPr>
           <a:p>
             <a:pPr indent="0">
@@ -2512,7 +2512,7 @@
               </a:spcBef>
               <a:buNone/>
             </a:pPr>
-            <a:endParaRPr b="0" lang="it-IT" sz="1400" spc="-1" strike="noStrike">
+            <a:endParaRPr b="0" lang="it-IT" sz="3200" spc="-1" strike="noStrike">
               <a:solidFill>
                 <a:srgbClr val="000000"/>
               </a:solidFill>
@@ -2533,8 +2533,8 @@
         </p:nvSpPr>
         <p:spPr>
           <a:xfrm>
-            <a:off x="471960" y="3334680"/>
-            <a:ext cx="4011840" cy="1292400"/>
+            <a:off x="471960" y="3334320"/>
+            <a:ext cx="4011840" cy="1292040"/>
           </a:xfrm>
           <a:prstGeom prst="rect">
             <a:avLst/>
@@ -2546,7 +2546,7 @@
         </p:spPr>
         <p:txBody>
           <a:bodyPr lIns="0" rIns="0" tIns="0" bIns="0" anchor="t">
-            <a:normAutofit/>
+            <a:normAutofit fontScale="97000"/>
           </a:bodyPr>
           <a:p>
             <a:pPr indent="0">
@@ -2555,7 +2555,7 @@
               </a:spcBef>
               <a:buNone/>
             </a:pPr>
-            <a:endParaRPr b="0" lang="it-IT" sz="1400" spc="-1" strike="noStrike">
+            <a:endParaRPr b="0" lang="it-IT" sz="3200" spc="-1" strike="noStrike">
               <a:solidFill>
                 <a:srgbClr val="000000"/>
               </a:solidFill>
@@ -2576,8 +2576,8 @@
         </p:nvSpPr>
         <p:spPr>
           <a:xfrm>
-            <a:off x="4684680" y="3334680"/>
-            <a:ext cx="4011840" cy="1292400"/>
+            <a:off x="4684680" y="3334320"/>
+            <a:ext cx="4011840" cy="1292040"/>
           </a:xfrm>
           <a:prstGeom prst="rect">
             <a:avLst/>
@@ -2589,7 +2589,7 @@
         </p:spPr>
         <p:txBody>
           <a:bodyPr lIns="0" rIns="0" tIns="0" bIns="0" anchor="t">
-            <a:normAutofit/>
+            <a:normAutofit fontScale="97000"/>
           </a:bodyPr>
           <a:p>
             <a:pPr indent="0">
@@ -2598,7 +2598,7 @@
               </a:spcBef>
               <a:buNone/>
             </a:pPr>
-            <a:endParaRPr b="0" lang="it-IT" sz="1400" spc="-1" strike="noStrike">
+            <a:endParaRPr b="0" lang="it-IT" sz="3200" spc="-1" strike="noStrike">
               <a:solidFill>
                 <a:srgbClr val="000000"/>
               </a:solidFill>
@@ -2621,7 +2621,7 @@
         <p:txBody>
           <a:bodyPr/>
           <a:p>
-            <a:fld id="{3EA7385B-3E9E-4C03-96D0-8982D11916F3}" type="slidenum">
+            <a:fld id="{7F60899F-3307-4322-9F8F-DD927B4D80A8}" type="slidenum">
               <a:t>&lt;#&gt;</a:t>
             </a:fld>
           </a:p>
@@ -2662,7 +2662,7 @@
         <p:spPr>
           <a:xfrm>
             <a:off x="471960" y="738720"/>
-            <a:ext cx="8221680" cy="767160"/>
+            <a:ext cx="8221320" cy="766800"/>
           </a:xfrm>
           <a:prstGeom prst="rect">
             <a:avLst/>
@@ -2677,10 +2677,10 @@
             <a:noAutofit/>
           </a:bodyPr>
           <a:p>
-            <a:pPr indent="0">
-              <a:buNone/>
-            </a:pPr>
-            <a:endParaRPr b="0" lang="it-IT" sz="1400" spc="-1" strike="noStrike">
+            <a:pPr indent="0" algn="ctr">
+              <a:buNone/>
+            </a:pPr>
+            <a:endParaRPr b="0" lang="it-IT" sz="4400" spc="-1" strike="noStrike">
               <a:solidFill>
                 <a:srgbClr val="000000"/>
               </a:solidFill>
@@ -2702,7 +2702,7 @@
         <p:spPr>
           <a:xfrm>
             <a:off x="471960" y="1919160"/>
-            <a:ext cx="2647080" cy="1292400"/>
+            <a:ext cx="2647080" cy="1292040"/>
           </a:xfrm>
           <a:prstGeom prst="rect">
             <a:avLst/>
@@ -2714,7 +2714,7 @@
         </p:spPr>
         <p:txBody>
           <a:bodyPr lIns="0" rIns="0" tIns="0" bIns="0" anchor="t">
-            <a:normAutofit/>
+            <a:normAutofit fontScale="94000"/>
           </a:bodyPr>
           <a:p>
             <a:pPr indent="0">
@@ -2723,7 +2723,7 @@
               </a:spcBef>
               <a:buNone/>
             </a:pPr>
-            <a:endParaRPr b="0" lang="it-IT" sz="1400" spc="-1" strike="noStrike">
+            <a:endParaRPr b="0" lang="it-IT" sz="3200" spc="-1" strike="noStrike">
               <a:solidFill>
                 <a:srgbClr val="000000"/>
               </a:solidFill>
@@ -2745,7 +2745,7 @@
         <p:spPr>
           <a:xfrm>
             <a:off x="3251880" y="1919160"/>
-            <a:ext cx="2647080" cy="1292400"/>
+            <a:ext cx="2647080" cy="1292040"/>
           </a:xfrm>
           <a:prstGeom prst="rect">
             <a:avLst/>
@@ -2757,7 +2757,7 @@
         </p:spPr>
         <p:txBody>
           <a:bodyPr lIns="0" rIns="0" tIns="0" bIns="0" anchor="t">
-            <a:normAutofit/>
+            <a:normAutofit fontScale="94000"/>
           </a:bodyPr>
           <a:p>
             <a:pPr indent="0">
@@ -2766,7 +2766,7 @@
               </a:spcBef>
               <a:buNone/>
             </a:pPr>
-            <a:endParaRPr b="0" lang="it-IT" sz="1400" spc="-1" strike="noStrike">
+            <a:endParaRPr b="0" lang="it-IT" sz="3200" spc="-1" strike="noStrike">
               <a:solidFill>
                 <a:srgbClr val="000000"/>
               </a:solidFill>
@@ -2788,7 +2788,7 @@
         <p:spPr>
           <a:xfrm>
             <a:off x="6031440" y="1919160"/>
-            <a:ext cx="2647080" cy="1292400"/>
+            <a:ext cx="2647080" cy="1292040"/>
           </a:xfrm>
           <a:prstGeom prst="rect">
             <a:avLst/>
@@ -2800,7 +2800,7 @@
         </p:spPr>
         <p:txBody>
           <a:bodyPr lIns="0" rIns="0" tIns="0" bIns="0" anchor="t">
-            <a:normAutofit/>
+            <a:normAutofit fontScale="94000"/>
           </a:bodyPr>
           <a:p>
             <a:pPr indent="0">
@@ -2809,7 +2809,7 @@
               </a:spcBef>
               <a:buNone/>
             </a:pPr>
-            <a:endParaRPr b="0" lang="it-IT" sz="1400" spc="-1" strike="noStrike">
+            <a:endParaRPr b="0" lang="it-IT" sz="3200" spc="-1" strike="noStrike">
               <a:solidFill>
                 <a:srgbClr val="000000"/>
               </a:solidFill>
@@ -2830,8 +2830,8 @@
         </p:nvSpPr>
         <p:spPr>
           <a:xfrm>
-            <a:off x="471960" y="3334680"/>
-            <a:ext cx="2647080" cy="1292400"/>
+            <a:off x="471960" y="3334320"/>
+            <a:ext cx="2647080" cy="1292040"/>
           </a:xfrm>
           <a:prstGeom prst="rect">
             <a:avLst/>
@@ -2843,7 +2843,7 @@
         </p:spPr>
         <p:txBody>
           <a:bodyPr lIns="0" rIns="0" tIns="0" bIns="0" anchor="t">
-            <a:normAutofit/>
+            <a:normAutofit fontScale="94000"/>
           </a:bodyPr>
           <a:p>
             <a:pPr indent="0">
@@ -2852,7 +2852,7 @@
               </a:spcBef>
               <a:buNone/>
             </a:pPr>
-            <a:endParaRPr b="0" lang="it-IT" sz="1400" spc="-1" strike="noStrike">
+            <a:endParaRPr b="0" lang="it-IT" sz="3200" spc="-1" strike="noStrike">
               <a:solidFill>
                 <a:srgbClr val="000000"/>
               </a:solidFill>
@@ -2873,8 +2873,8 @@
         </p:nvSpPr>
         <p:spPr>
           <a:xfrm>
-            <a:off x="3251880" y="3334680"/>
-            <a:ext cx="2647080" cy="1292400"/>
+            <a:off x="3251880" y="3334320"/>
+            <a:ext cx="2647080" cy="1292040"/>
           </a:xfrm>
           <a:prstGeom prst="rect">
             <a:avLst/>
@@ -2886,7 +2886,7 @@
         </p:spPr>
         <p:txBody>
           <a:bodyPr lIns="0" rIns="0" tIns="0" bIns="0" anchor="t">
-            <a:normAutofit/>
+            <a:normAutofit fontScale="94000"/>
           </a:bodyPr>
           <a:p>
             <a:pPr indent="0">
@@ -2895,7 +2895,7 @@
               </a:spcBef>
               <a:buNone/>
             </a:pPr>
-            <a:endParaRPr b="0" lang="it-IT" sz="1400" spc="-1" strike="noStrike">
+            <a:endParaRPr b="0" lang="it-IT" sz="3200" spc="-1" strike="noStrike">
               <a:solidFill>
                 <a:srgbClr val="000000"/>
               </a:solidFill>
@@ -2916,8 +2916,8 @@
         </p:nvSpPr>
         <p:spPr>
           <a:xfrm>
-            <a:off x="6031440" y="3334680"/>
-            <a:ext cx="2647080" cy="1292400"/>
+            <a:off x="6031440" y="3334320"/>
+            <a:ext cx="2647080" cy="1292040"/>
           </a:xfrm>
           <a:prstGeom prst="rect">
             <a:avLst/>
@@ -2929,7 +2929,7 @@
         </p:spPr>
         <p:txBody>
           <a:bodyPr lIns="0" rIns="0" tIns="0" bIns="0" anchor="t">
-            <a:normAutofit/>
+            <a:normAutofit fontScale="94000"/>
           </a:bodyPr>
           <a:p>
             <a:pPr indent="0">
@@ -2938,7 +2938,7 @@
               </a:spcBef>
               <a:buNone/>
             </a:pPr>
-            <a:endParaRPr b="0" lang="it-IT" sz="1400" spc="-1" strike="noStrike">
+            <a:endParaRPr b="0" lang="it-IT" sz="3200" spc="-1" strike="noStrike">
               <a:solidFill>
                 <a:srgbClr val="000000"/>
               </a:solidFill>
@@ -2961,7 +2961,7 @@
         <p:txBody>
           <a:bodyPr/>
           <a:p>
-            <a:fld id="{67F77CF2-94E6-46C1-A1B6-B58C516166D0}" type="slidenum">
+            <a:fld id="{AB21D030-6D11-4AC7-B4C1-A2CDB2462FE0}" type="slidenum">
               <a:t>&lt;#&gt;</a:t>
             </a:fld>
           </a:p>
@@ -3002,7 +3002,7 @@
         <p:spPr>
           <a:xfrm>
             <a:off x="471960" y="738720"/>
-            <a:ext cx="8221680" cy="767160"/>
+            <a:ext cx="8221320" cy="766800"/>
           </a:xfrm>
           <a:prstGeom prst="rect">
             <a:avLst/>
@@ -3017,10 +3017,10 @@
             <a:noAutofit/>
           </a:bodyPr>
           <a:p>
-            <a:pPr indent="0">
-              <a:buNone/>
-            </a:pPr>
-            <a:endParaRPr b="0" lang="it-IT" sz="1400" spc="-1" strike="noStrike">
+            <a:pPr indent="0" algn="ctr">
+              <a:buNone/>
+            </a:pPr>
+            <a:endParaRPr b="0" lang="it-IT" sz="4400" spc="-1" strike="noStrike">
               <a:solidFill>
                 <a:srgbClr val="000000"/>
               </a:solidFill>
@@ -3042,7 +3042,7 @@
         <p:spPr>
           <a:xfrm>
             <a:off x="471960" y="1919160"/>
-            <a:ext cx="8221680" cy="2709720"/>
+            <a:ext cx="8221320" cy="2709360"/>
           </a:xfrm>
           <a:prstGeom prst="rect">
             <a:avLst/>
@@ -3063,7 +3063,7 @@
               </a:spcBef>
               <a:buNone/>
             </a:pPr>
-            <a:endParaRPr b="0" lang="it-IT" sz="1400" spc="-1" strike="noStrike">
+            <a:endParaRPr b="0" lang="it-IT" sz="3200" spc="-1" strike="noStrike">
               <a:solidFill>
                 <a:srgbClr val="000000"/>
               </a:solidFill>
@@ -3086,7 +3086,7 @@
         <p:txBody>
           <a:bodyPr/>
           <a:p>
-            <a:fld id="{A88B2D94-8F02-45C6-948E-FBDE3BC89C2F}" type="slidenum">
+            <a:fld id="{05101237-82FA-4FCC-AB28-E75CD3D9EF8C}" type="slidenum">
               <a:t>&lt;#&gt;</a:t>
             </a:fld>
           </a:p>
@@ -3127,7 +3127,7 @@
         <p:spPr>
           <a:xfrm>
             <a:off x="471960" y="738720"/>
-            <a:ext cx="8221680" cy="767160"/>
+            <a:ext cx="8221320" cy="766800"/>
           </a:xfrm>
           <a:prstGeom prst="rect">
             <a:avLst/>
@@ -3142,10 +3142,10 @@
             <a:noAutofit/>
           </a:bodyPr>
           <a:p>
-            <a:pPr indent="0">
-              <a:buNone/>
-            </a:pPr>
-            <a:endParaRPr b="0" lang="it-IT" sz="1400" spc="-1" strike="noStrike">
+            <a:pPr indent="0" algn="ctr">
+              <a:buNone/>
+            </a:pPr>
+            <a:endParaRPr b="0" lang="it-IT" sz="4400" spc="-1" strike="noStrike">
               <a:solidFill>
                 <a:srgbClr val="000000"/>
               </a:solidFill>
@@ -3167,7 +3167,7 @@
         <p:spPr>
           <a:xfrm>
             <a:off x="471960" y="1919160"/>
-            <a:ext cx="4011840" cy="2709720"/>
+            <a:ext cx="4011840" cy="2709360"/>
           </a:xfrm>
           <a:prstGeom prst="rect">
             <a:avLst/>
@@ -3188,7 +3188,7 @@
               </a:spcBef>
               <a:buNone/>
             </a:pPr>
-            <a:endParaRPr b="0" lang="it-IT" sz="1400" spc="-1" strike="noStrike">
+            <a:endParaRPr b="0" lang="it-IT" sz="3200" spc="-1" strike="noStrike">
               <a:solidFill>
                 <a:srgbClr val="000000"/>
               </a:solidFill>
@@ -3210,7 +3210,7 @@
         <p:spPr>
           <a:xfrm>
             <a:off x="4684680" y="1919160"/>
-            <a:ext cx="4011840" cy="2709720"/>
+            <a:ext cx="4011840" cy="2709360"/>
           </a:xfrm>
           <a:prstGeom prst="rect">
             <a:avLst/>
@@ -3231,7 +3231,7 @@
               </a:spcBef>
               <a:buNone/>
             </a:pPr>
-            <a:endParaRPr b="0" lang="it-IT" sz="1400" spc="-1" strike="noStrike">
+            <a:endParaRPr b="0" lang="it-IT" sz="3200" spc="-1" strike="noStrike">
               <a:solidFill>
                 <a:srgbClr val="000000"/>
               </a:solidFill>
@@ -3254,7 +3254,7 @@
         <p:txBody>
           <a:bodyPr/>
           <a:p>
-            <a:fld id="{C1AEB676-518F-4C66-8817-10D7EEC6B6F1}" type="slidenum">
+            <a:fld id="{BE76CF1F-D9A7-409B-9482-724219338966}" type="slidenum">
               <a:t>&lt;#&gt;</a:t>
             </a:fld>
           </a:p>
@@ -3295,7 +3295,7 @@
         <p:spPr>
           <a:xfrm>
             <a:off x="471960" y="738720"/>
-            <a:ext cx="8221680" cy="767160"/>
+            <a:ext cx="8221320" cy="766800"/>
           </a:xfrm>
           <a:prstGeom prst="rect">
             <a:avLst/>
@@ -3310,10 +3310,10 @@
             <a:noAutofit/>
           </a:bodyPr>
           <a:p>
-            <a:pPr indent="0">
-              <a:buNone/>
-            </a:pPr>
-            <a:endParaRPr b="0" lang="it-IT" sz="1400" spc="-1" strike="noStrike">
+            <a:pPr indent="0" algn="ctr">
+              <a:buNone/>
+            </a:pPr>
+            <a:endParaRPr b="0" lang="it-IT" sz="4400" spc="-1" strike="noStrike">
               <a:solidFill>
                 <a:srgbClr val="000000"/>
               </a:solidFill>
@@ -3336,7 +3336,7 @@
         <p:txBody>
           <a:bodyPr/>
           <a:p>
-            <a:fld id="{7B346DA9-273A-466C-8BD2-40501AD4D70C}" type="slidenum">
+            <a:fld id="{0DDC7056-37DE-477B-9FC2-32134CD6FC66}" type="slidenum">
               <a:t>&lt;#&gt;</a:t>
             </a:fld>
           </a:p>
@@ -3377,7 +3377,7 @@
         <p:spPr>
           <a:xfrm>
             <a:off x="471960" y="738720"/>
-            <a:ext cx="8221680" cy="3557520"/>
+            <a:ext cx="8221320" cy="3555720"/>
           </a:xfrm>
           <a:prstGeom prst="rect">
             <a:avLst/>
@@ -3416,7 +3416,7 @@
         <p:txBody>
           <a:bodyPr/>
           <a:p>
-            <a:fld id="{41982F55-45AB-42A3-A0D8-FF2C84C67861}" type="slidenum">
+            <a:fld id="{9E736C77-F686-46D5-9169-A08FBBAE6025}" type="slidenum">
               <a:t>&lt;#&gt;</a:t>
             </a:fld>
           </a:p>
@@ -3457,7 +3457,7 @@
         <p:spPr>
           <a:xfrm>
             <a:off x="471960" y="738720"/>
-            <a:ext cx="8221680" cy="767160"/>
+            <a:ext cx="8221320" cy="766800"/>
           </a:xfrm>
           <a:prstGeom prst="rect">
             <a:avLst/>
@@ -3472,10 +3472,10 @@
             <a:noAutofit/>
           </a:bodyPr>
           <a:p>
-            <a:pPr indent="0">
-              <a:buNone/>
-            </a:pPr>
-            <a:endParaRPr b="0" lang="it-IT" sz="1400" spc="-1" strike="noStrike">
+            <a:pPr indent="0" algn="ctr">
+              <a:buNone/>
+            </a:pPr>
+            <a:endParaRPr b="0" lang="it-IT" sz="4400" spc="-1" strike="noStrike">
               <a:solidFill>
                 <a:srgbClr val="000000"/>
               </a:solidFill>
@@ -3497,7 +3497,7 @@
         <p:spPr>
           <a:xfrm>
             <a:off x="471960" y="1919160"/>
-            <a:ext cx="4011840" cy="1292400"/>
+            <a:ext cx="4011840" cy="1292040"/>
           </a:xfrm>
           <a:prstGeom prst="rect">
             <a:avLst/>
@@ -3509,7 +3509,7 @@
         </p:spPr>
         <p:txBody>
           <a:bodyPr lIns="0" rIns="0" tIns="0" bIns="0" anchor="t">
-            <a:normAutofit/>
+            <a:normAutofit fontScale="97000"/>
           </a:bodyPr>
           <a:p>
             <a:pPr indent="0">
@@ -3518,7 +3518,7 @@
               </a:spcBef>
               <a:buNone/>
             </a:pPr>
-            <a:endParaRPr b="0" lang="it-IT" sz="1400" spc="-1" strike="noStrike">
+            <a:endParaRPr b="0" lang="it-IT" sz="3200" spc="-1" strike="noStrike">
               <a:solidFill>
                 <a:srgbClr val="000000"/>
               </a:solidFill>
@@ -3540,7 +3540,7 @@
         <p:spPr>
           <a:xfrm>
             <a:off x="4684680" y="1919160"/>
-            <a:ext cx="4011840" cy="2709720"/>
+            <a:ext cx="4011840" cy="2709360"/>
           </a:xfrm>
           <a:prstGeom prst="rect">
             <a:avLst/>
@@ -3561,7 +3561,7 @@
               </a:spcBef>
               <a:buNone/>
             </a:pPr>
-            <a:endParaRPr b="0" lang="it-IT" sz="1400" spc="-1" strike="noStrike">
+            <a:endParaRPr b="0" lang="it-IT" sz="3200" spc="-1" strike="noStrike">
               <a:solidFill>
                 <a:srgbClr val="000000"/>
               </a:solidFill>
@@ -3582,8 +3582,8 @@
         </p:nvSpPr>
         <p:spPr>
           <a:xfrm>
-            <a:off x="471960" y="3334680"/>
-            <a:ext cx="4011840" cy="1292400"/>
+            <a:off x="471960" y="3334320"/>
+            <a:ext cx="4011840" cy="1292040"/>
           </a:xfrm>
           <a:prstGeom prst="rect">
             <a:avLst/>
@@ -3595,7 +3595,7 @@
         </p:spPr>
         <p:txBody>
           <a:bodyPr lIns="0" rIns="0" tIns="0" bIns="0" anchor="t">
-            <a:normAutofit/>
+            <a:normAutofit fontScale="97000"/>
           </a:bodyPr>
           <a:p>
             <a:pPr indent="0">
@@ -3604,7 +3604,7 @@
               </a:spcBef>
               <a:buNone/>
             </a:pPr>
-            <a:endParaRPr b="0" lang="it-IT" sz="1400" spc="-1" strike="noStrike">
+            <a:endParaRPr b="0" lang="it-IT" sz="3200" spc="-1" strike="noStrike">
               <a:solidFill>
                 <a:srgbClr val="000000"/>
               </a:solidFill>
@@ -3627,7 +3627,7 @@
         <p:txBody>
           <a:bodyPr/>
           <a:p>
-            <a:fld id="{DAFA692F-85EA-4472-9479-B605FF00D5FB}" type="slidenum">
+            <a:fld id="{7DEB4E8C-5E6D-4CD3-A2A9-AC317E225267}" type="slidenum">
               <a:t>&lt;#&gt;</a:t>
             </a:fld>
           </a:p>
@@ -3668,7 +3668,7 @@
         <p:spPr>
           <a:xfrm>
             <a:off x="471960" y="738720"/>
-            <a:ext cx="8221680" cy="767160"/>
+            <a:ext cx="8221320" cy="766800"/>
           </a:xfrm>
           <a:prstGeom prst="rect">
             <a:avLst/>
@@ -3683,10 +3683,10 @@
             <a:noAutofit/>
           </a:bodyPr>
           <a:p>
-            <a:pPr indent="0">
-              <a:buNone/>
-            </a:pPr>
-            <a:endParaRPr b="0" lang="it-IT" sz="1400" spc="-1" strike="noStrike">
+            <a:pPr indent="0" algn="ctr">
+              <a:buNone/>
+            </a:pPr>
+            <a:endParaRPr b="0" lang="it-IT" sz="4400" spc="-1" strike="noStrike">
               <a:solidFill>
                 <a:srgbClr val="000000"/>
               </a:solidFill>
@@ -3708,7 +3708,7 @@
         <p:spPr>
           <a:xfrm>
             <a:off x="471960" y="1919160"/>
-            <a:ext cx="4011840" cy="2709720"/>
+            <a:ext cx="4011840" cy="2709360"/>
           </a:xfrm>
           <a:prstGeom prst="rect">
             <a:avLst/>
@@ -3729,7 +3729,7 @@
               </a:spcBef>
               <a:buNone/>
             </a:pPr>
-            <a:endParaRPr b="0" lang="it-IT" sz="1400" spc="-1" strike="noStrike">
+            <a:endParaRPr b="0" lang="it-IT" sz="3200" spc="-1" strike="noStrike">
               <a:solidFill>
                 <a:srgbClr val="000000"/>
               </a:solidFill>
@@ -3751,7 +3751,7 @@
         <p:spPr>
           <a:xfrm>
             <a:off x="4684680" y="1919160"/>
-            <a:ext cx="4011840" cy="1292400"/>
+            <a:ext cx="4011840" cy="1292040"/>
           </a:xfrm>
           <a:prstGeom prst="rect">
             <a:avLst/>
@@ -3763,7 +3763,7 @@
         </p:spPr>
         <p:txBody>
           <a:bodyPr lIns="0" rIns="0" tIns="0" bIns="0" anchor="t">
-            <a:normAutofit/>
+            <a:normAutofit fontScale="97000"/>
           </a:bodyPr>
           <a:p>
             <a:pPr indent="0">
@@ -3772,7 +3772,7 @@
               </a:spcBef>
               <a:buNone/>
             </a:pPr>
-            <a:endParaRPr b="0" lang="it-IT" sz="1400" spc="-1" strike="noStrike">
+            <a:endParaRPr b="0" lang="it-IT" sz="3200" spc="-1" strike="noStrike">
               <a:solidFill>
                 <a:srgbClr val="000000"/>
               </a:solidFill>
@@ -3793,8 +3793,8 @@
         </p:nvSpPr>
         <p:spPr>
           <a:xfrm>
-            <a:off x="4684680" y="3334680"/>
-            <a:ext cx="4011840" cy="1292400"/>
+            <a:off x="4684680" y="3334320"/>
+            <a:ext cx="4011840" cy="1292040"/>
           </a:xfrm>
           <a:prstGeom prst="rect">
             <a:avLst/>
@@ -3806,7 +3806,7 @@
         </p:spPr>
         <p:txBody>
           <a:bodyPr lIns="0" rIns="0" tIns="0" bIns="0" anchor="t">
-            <a:normAutofit/>
+            <a:normAutofit fontScale="97000"/>
           </a:bodyPr>
           <a:p>
             <a:pPr indent="0">
@@ -3815,7 +3815,7 @@
               </a:spcBef>
               <a:buNone/>
             </a:pPr>
-            <a:endParaRPr b="0" lang="it-IT" sz="1400" spc="-1" strike="noStrike">
+            <a:endParaRPr b="0" lang="it-IT" sz="3200" spc="-1" strike="noStrike">
               <a:solidFill>
                 <a:srgbClr val="000000"/>
               </a:solidFill>
@@ -3838,7 +3838,7 @@
         <p:txBody>
           <a:bodyPr/>
           <a:p>
-            <a:fld id="{4C148EBC-1D86-416F-9E4A-FA48231A68FC}" type="slidenum">
+            <a:fld id="{0EA2EE3C-1973-47D9-95E8-FBA6ACD90BB0}" type="slidenum">
               <a:t>&lt;#&gt;</a:t>
             </a:fld>
           </a:p>
@@ -3879,7 +3879,7 @@
         <p:spPr>
           <a:xfrm>
             <a:off x="471960" y="738720"/>
-            <a:ext cx="8221680" cy="767160"/>
+            <a:ext cx="8221320" cy="766800"/>
           </a:xfrm>
           <a:prstGeom prst="rect">
             <a:avLst/>
@@ -3894,10 +3894,10 @@
             <a:noAutofit/>
           </a:bodyPr>
           <a:p>
-            <a:pPr indent="0">
-              <a:buNone/>
-            </a:pPr>
-            <a:endParaRPr b="0" lang="it-IT" sz="1400" spc="-1" strike="noStrike">
+            <a:pPr indent="0" algn="ctr">
+              <a:buNone/>
+            </a:pPr>
+            <a:endParaRPr b="0" lang="it-IT" sz="4400" spc="-1" strike="noStrike">
               <a:solidFill>
                 <a:srgbClr val="000000"/>
               </a:solidFill>
@@ -3919,7 +3919,7 @@
         <p:spPr>
           <a:xfrm>
             <a:off x="471960" y="1919160"/>
-            <a:ext cx="4011840" cy="1292400"/>
+            <a:ext cx="4011840" cy="1292040"/>
           </a:xfrm>
           <a:prstGeom prst="rect">
             <a:avLst/>
@@ -3931,7 +3931,7 @@
         </p:spPr>
         <p:txBody>
           <a:bodyPr lIns="0" rIns="0" tIns="0" bIns="0" anchor="t">
-            <a:normAutofit/>
+            <a:normAutofit fontScale="97000"/>
           </a:bodyPr>
           <a:p>
             <a:pPr indent="0">
@@ -3940,7 +3940,7 @@
               </a:spcBef>
               <a:buNone/>
             </a:pPr>
-            <a:endParaRPr b="0" lang="it-IT" sz="1400" spc="-1" strike="noStrike">
+            <a:endParaRPr b="0" lang="it-IT" sz="3200" spc="-1" strike="noStrike">
               <a:solidFill>
                 <a:srgbClr val="000000"/>
               </a:solidFill>
@@ -3962,7 +3962,7 @@
         <p:spPr>
           <a:xfrm>
             <a:off x="4684680" y="1919160"/>
-            <a:ext cx="4011840" cy="1292400"/>
+            <a:ext cx="4011840" cy="1292040"/>
           </a:xfrm>
           <a:prstGeom prst="rect">
             <a:avLst/>
@@ -3974,7 +3974,7 @@
         </p:spPr>
         <p:txBody>
           <a:bodyPr lIns="0" rIns="0" tIns="0" bIns="0" anchor="t">
-            <a:normAutofit/>
+            <a:normAutofit fontScale="97000"/>
           </a:bodyPr>
           <a:p>
             <a:pPr indent="0">
@@ -3983,7 +3983,7 @@
               </a:spcBef>
               <a:buNone/>
             </a:pPr>
-            <a:endParaRPr b="0" lang="it-IT" sz="1400" spc="-1" strike="noStrike">
+            <a:endParaRPr b="0" lang="it-IT" sz="3200" spc="-1" strike="noStrike">
               <a:solidFill>
                 <a:srgbClr val="000000"/>
               </a:solidFill>
@@ -4004,8 +4004,8 @@
         </p:nvSpPr>
         <p:spPr>
           <a:xfrm>
-            <a:off x="471960" y="3334680"/>
-            <a:ext cx="8221680" cy="1292400"/>
+            <a:off x="471960" y="3334320"/>
+            <a:ext cx="8221320" cy="1292040"/>
           </a:xfrm>
           <a:prstGeom prst="rect">
             <a:avLst/>
@@ -4026,7 +4026,7 @@
               </a:spcBef>
               <a:buNone/>
             </a:pPr>
-            <a:endParaRPr b="0" lang="it-IT" sz="1400" spc="-1" strike="noStrike">
+            <a:endParaRPr b="0" lang="it-IT" sz="3200" spc="-1" strike="noStrike">
               <a:solidFill>
                 <a:srgbClr val="000000"/>
               </a:solidFill>
@@ -4049,7 +4049,7 @@
         <p:txBody>
           <a:bodyPr/>
           <a:p>
-            <a:fld id="{87DA480D-FE32-44BC-B840-BD3CD545576F}" type="slidenum">
+            <a:fld id="{468643E7-6614-4E0B-B3B7-E765D729DC0E}" type="slidenum">
               <a:t>&lt;#&gt;</a:t>
             </a:fld>
           </a:p>
@@ -4092,8 +4092,8 @@
         </p:nvSpPr>
         <p:spPr>
           <a:xfrm flipH="1">
-            <a:off x="8246520" y="4245840"/>
-            <a:ext cx="897120" cy="897120"/>
+            <a:off x="8245800" y="4245840"/>
+            <a:ext cx="896760" cy="896760"/>
           </a:xfrm>
           <a:prstGeom prst="rtTriangle">
             <a:avLst/>
@@ -4112,7 +4112,7 @@
           <a:fontRef idx="minor"/>
         </p:style>
         <p:txBody>
-          <a:bodyPr tIns="91440" bIns="91440" anchor="ctr">
+          <a:bodyPr lIns="90000" rIns="90000" tIns="91440" bIns="91440" anchor="ctr">
             <a:noAutofit/>
           </a:bodyPr>
           <a:p>
@@ -4126,6 +4126,7 @@
                 <a:srgbClr val="000000"/>
               </a:solidFill>
               <a:latin typeface="Arial"/>
+              <a:ea typeface="DejaVu Sans"/>
             </a:endParaRPr>
           </a:p>
         </p:txBody>
@@ -4138,8 +4139,8 @@
         </p:nvSpPr>
         <p:spPr>
           <a:xfrm flipH="1">
-            <a:off x="8246520" y="4245840"/>
-            <a:ext cx="897120" cy="897120"/>
+            <a:off x="8245800" y="4245840"/>
+            <a:ext cx="896760" cy="896760"/>
           </a:xfrm>
           <a:prstGeom prst="round1Rect">
             <a:avLst>
@@ -4162,7 +4163,7 @@
           <a:fontRef idx="minor"/>
         </p:style>
         <p:txBody>
-          <a:bodyPr tIns="91440" bIns="91440" anchor="ctr">
+          <a:bodyPr lIns="90000" rIns="90000" tIns="91440" bIns="91440" anchor="ctr">
             <a:noAutofit/>
           </a:bodyPr>
           <a:p>
@@ -4176,6 +4177,7 @@
                 <a:srgbClr val="000000"/>
               </a:solidFill>
               <a:latin typeface="Arial"/>
+              <a:ea typeface="DejaVu Sans"/>
             </a:endParaRPr>
           </a:p>
         </p:txBody>
@@ -4192,19 +4194,19 @@
         </p:nvSpPr>
         <p:spPr>
           <a:xfrm>
-            <a:off x="390600" y="1819440"/>
-            <a:ext cx="8221680" cy="933120"/>
-          </a:xfrm>
-          <a:prstGeom prst="rect">
-            <a:avLst/>
-          </a:prstGeom>
-          <a:noFill/>
-          <a:ln w="0">
-            <a:noFill/>
-          </a:ln>
-        </p:spPr>
-        <p:txBody>
-          <a:bodyPr tIns="91440" bIns="91440" anchor="b">
+            <a:off x="471960" y="738720"/>
+            <a:ext cx="8221320" cy="766800"/>
+          </a:xfrm>
+          <a:prstGeom prst="rect">
+            <a:avLst/>
+          </a:prstGeom>
+          <a:noFill/>
+          <a:ln w="0">
+            <a:noFill/>
+          </a:ln>
+        </p:spPr>
+        <p:txBody>
+          <a:bodyPr lIns="0" rIns="0" tIns="0" bIns="0" anchor="ctr">
             <a:noAutofit/>
           </a:bodyPr>
           <a:p>
@@ -4212,7 +4214,7 @@
               <a:buNone/>
             </a:pPr>
             <a:r>
-              <a:rPr b="0" lang="it-IT" sz="4800" spc="-1" strike="noStrike">
+              <a:rPr b="0" lang="it-IT" sz="1800" spc="-1" strike="noStrike">
                 <a:solidFill>
                   <a:srgbClr val="000000"/>
                 </a:solidFill>
@@ -4220,7 +4222,7 @@
               </a:rPr>
               <a:t>Fai clic per modificare il formato del testo del titolo</a:t>
             </a:r>
-            <a:endParaRPr b="0" lang="it-IT" sz="4800" spc="-1" strike="noStrike">
+            <a:endParaRPr b="0" lang="it-IT" sz="1800" spc="-1" strike="noStrike">
               <a:solidFill>
                 <a:srgbClr val="000000"/>
               </a:solidFill>
@@ -4242,18 +4244,18 @@
         <p:spPr>
           <a:xfrm>
             <a:off x="8523720" y="4695480"/>
-            <a:ext cx="548280" cy="393120"/>
-          </a:xfrm>
-          <a:prstGeom prst="rect">
-            <a:avLst/>
-          </a:prstGeom>
-          <a:noFill/>
-          <a:ln w="0">
-            <a:noFill/>
-          </a:ln>
-        </p:spPr>
-        <p:txBody>
-          <a:bodyPr tIns="91440" bIns="91440" anchor="ctr">
+            <a:ext cx="547920" cy="392760"/>
+          </a:xfrm>
+          <a:prstGeom prst="rect">
+            <a:avLst/>
+          </a:prstGeom>
+          <a:noFill/>
+          <a:ln w="0">
+            <a:noFill/>
+          </a:ln>
+        </p:spPr>
+        <p:txBody>
+          <a:bodyPr lIns="90000" rIns="90000" tIns="91440" bIns="91440" anchor="ctr">
             <a:noAutofit/>
           </a:bodyPr>
           <a:lstStyle>
@@ -4262,6 +4264,9 @@
                 <a:spcPct val="100000"/>
               </a:lnSpc>
               <a:buNone/>
+              <a:tabLst>
+                <a:tab algn="l" pos="0"/>
+              </a:tabLst>
               <a:defRPr b="0" lang="it" sz="1400" spc="-1" strike="noStrike">
                 <a:solidFill>
                   <a:srgbClr val="000000"/>
@@ -4277,8 +4282,11 @@
                 <a:spcPct val="100000"/>
               </a:lnSpc>
               <a:buNone/>
-            </a:pPr>
-            <a:fld id="{B887A22E-C225-4E5F-AFB2-9EC294C8C210}" type="slidenum">
+              <a:tabLst>
+                <a:tab algn="l" pos="0"/>
+              </a:tabLst>
+            </a:pPr>
+            <a:fld id="{D3F8BA79-232D-45E7-B687-CA422815EFDE}" type="slidenum">
               <a:rPr b="0" lang="it" sz="1400" spc="-1" strike="noStrike">
                 <a:solidFill>
                   <a:srgbClr val="000000"/>
@@ -4322,10 +4330,10 @@
         </p:spPr>
         <p:txBody>
           <a:bodyPr lIns="0" rIns="0" tIns="0" bIns="0" anchor="t">
-            <a:normAutofit/>
-          </a:bodyPr>
-          <a:p>
-            <a:pPr marL="432000" indent="-324000">
+            <a:normAutofit fontScale="92000"/>
+          </a:bodyPr>
+          <a:p>
+            <a:pPr marL="397440" indent="-298080">
               <a:spcBef>
                 <a:spcPts val="1417"/>
               </a:spcBef>
@@ -4337,7 +4345,7 @@
               <a:buChar char=""/>
             </a:pPr>
             <a:r>
-              <a:rPr b="0" lang="it-IT" sz="1400" spc="-1" strike="noStrike">
+              <a:rPr b="0" lang="it-IT" sz="3200" spc="-1" strike="noStrike">
                 <a:solidFill>
                   <a:srgbClr val="000000"/>
                 </a:solidFill>
@@ -4345,15 +4353,15 @@
               </a:rPr>
               <a:t>Fai clic per modificare il formato del testo della struttura</a:t>
             </a:r>
-            <a:endParaRPr b="0" lang="it-IT" sz="1400" spc="-1" strike="noStrike">
-              <a:solidFill>
-                <a:srgbClr val="000000"/>
-              </a:solidFill>
-              <a:latin typeface="Arial"/>
-            </a:endParaRPr>
-          </a:p>
-          <a:p>
-            <a:pPr lvl="1" marL="864000" indent="-324000">
+            <a:endParaRPr b="0" lang="it-IT" sz="3200" spc="-1" strike="noStrike">
+              <a:solidFill>
+                <a:srgbClr val="000000"/>
+              </a:solidFill>
+              <a:latin typeface="Arial"/>
+            </a:endParaRPr>
+          </a:p>
+          <a:p>
+            <a:pPr lvl="1" marL="794880" indent="-298080">
               <a:spcBef>
                 <a:spcPts val="1134"/>
               </a:spcBef>
@@ -4365,7 +4373,7 @@
               <a:buChar char=""/>
             </a:pPr>
             <a:r>
-              <a:rPr b="0" lang="it-IT" sz="1400" spc="-1" strike="noStrike">
+              <a:rPr b="0" lang="it-IT" sz="2800" spc="-1" strike="noStrike">
                 <a:solidFill>
                   <a:srgbClr val="000000"/>
                 </a:solidFill>
@@ -4373,15 +4381,15 @@
               </a:rPr>
               <a:t>Secondo livello struttura</a:t>
             </a:r>
-            <a:endParaRPr b="0" lang="it-IT" sz="1400" spc="-1" strike="noStrike">
-              <a:solidFill>
-                <a:srgbClr val="000000"/>
-              </a:solidFill>
-              <a:latin typeface="Arial"/>
-            </a:endParaRPr>
-          </a:p>
-          <a:p>
-            <a:pPr lvl="2" marL="1296000" indent="-288000">
+            <a:endParaRPr b="0" lang="it-IT" sz="2800" spc="-1" strike="noStrike">
+              <a:solidFill>
+                <a:srgbClr val="000000"/>
+              </a:solidFill>
+              <a:latin typeface="Arial"/>
+            </a:endParaRPr>
+          </a:p>
+          <a:p>
+            <a:pPr lvl="2" marL="1192320" indent="-264960">
               <a:spcBef>
                 <a:spcPts val="850"/>
               </a:spcBef>
@@ -4393,7 +4401,7 @@
               <a:buChar char=""/>
             </a:pPr>
             <a:r>
-              <a:rPr b="0" lang="it-IT" sz="1400" spc="-1" strike="noStrike">
+              <a:rPr b="0" lang="it-IT" sz="2400" spc="-1" strike="noStrike">
                 <a:solidFill>
                   <a:srgbClr val="000000"/>
                 </a:solidFill>
@@ -4401,15 +4409,15 @@
               </a:rPr>
               <a:t>Terzo livello struttura</a:t>
             </a:r>
-            <a:endParaRPr b="0" lang="it-IT" sz="1400" spc="-1" strike="noStrike">
-              <a:solidFill>
-                <a:srgbClr val="000000"/>
-              </a:solidFill>
-              <a:latin typeface="Arial"/>
-            </a:endParaRPr>
-          </a:p>
-          <a:p>
-            <a:pPr lvl="3" marL="1728000" indent="-216000">
+            <a:endParaRPr b="0" lang="it-IT" sz="2400" spc="-1" strike="noStrike">
+              <a:solidFill>
+                <a:srgbClr val="000000"/>
+              </a:solidFill>
+              <a:latin typeface="Arial"/>
+            </a:endParaRPr>
+          </a:p>
+          <a:p>
+            <a:pPr lvl="3" marL="1589760" indent="-198720">
               <a:spcBef>
                 <a:spcPts val="567"/>
               </a:spcBef>
@@ -4421,7 +4429,7 @@
               <a:buChar char=""/>
             </a:pPr>
             <a:r>
-              <a:rPr b="0" lang="it-IT" sz="1400" spc="-1" strike="noStrike">
+              <a:rPr b="0" lang="it-IT" sz="2000" spc="-1" strike="noStrike">
                 <a:solidFill>
                   <a:srgbClr val="000000"/>
                 </a:solidFill>
@@ -4429,15 +4437,15 @@
               </a:rPr>
               <a:t>Quarto livello struttura</a:t>
             </a:r>
-            <a:endParaRPr b="0" lang="it-IT" sz="1400" spc="-1" strike="noStrike">
-              <a:solidFill>
-                <a:srgbClr val="000000"/>
-              </a:solidFill>
-              <a:latin typeface="Arial"/>
-            </a:endParaRPr>
-          </a:p>
-          <a:p>
-            <a:pPr lvl="4" marL="2160000" indent="-216000">
+            <a:endParaRPr b="0" lang="it-IT" sz="2000" spc="-1" strike="noStrike">
+              <a:solidFill>
+                <a:srgbClr val="000000"/>
+              </a:solidFill>
+              <a:latin typeface="Arial"/>
+            </a:endParaRPr>
+          </a:p>
+          <a:p>
+            <a:pPr lvl="4" marL="1987200" indent="-198720">
               <a:spcBef>
                 <a:spcPts val="283"/>
               </a:spcBef>
@@ -4465,7 +4473,7 @@
             </a:endParaRPr>
           </a:p>
           <a:p>
-            <a:pPr lvl="5" marL="2592000" indent="-216000">
+            <a:pPr lvl="5" marL="2384640" indent="-198720">
               <a:spcBef>
                 <a:spcPts val="283"/>
               </a:spcBef>
@@ -4493,7 +4501,7 @@
             </a:endParaRPr>
           </a:p>
           <a:p>
-            <a:pPr lvl="6" marL="3024000" indent="-216000">
+            <a:pPr lvl="6" marL="2782080" indent="-198720">
               <a:spcBef>
                 <a:spcPts val="283"/>
               </a:spcBef>
@@ -4574,8 +4582,8 @@
         </p:nvSpPr>
         <p:spPr>
           <a:xfrm flipH="1" rot="10800000">
-            <a:off x="-360" y="1686240"/>
-            <a:ext cx="9143640" cy="3457080"/>
+            <a:off x="0" y="1686600"/>
+            <a:ext cx="9143280" cy="3456720"/>
           </a:xfrm>
           <a:prstGeom prst="rect">
             <a:avLst/>
@@ -4594,7 +4602,7 @@
           <a:fontRef idx="minor"/>
         </p:style>
         <p:txBody>
-          <a:bodyPr tIns="91440" bIns="91440" anchor="ctr">
+          <a:bodyPr lIns="90000" rIns="90000" tIns="91440" bIns="91440" anchor="ctr">
             <a:noAutofit/>
           </a:bodyPr>
           <a:p>
@@ -4608,6 +4616,7 @@
                 <a:srgbClr val="000000"/>
               </a:solidFill>
               <a:latin typeface="Arial"/>
+              <a:ea typeface="DejaVu Sans"/>
             </a:endParaRPr>
           </a:p>
         </p:txBody>
@@ -4621,7 +4630,7 @@
         <p:spPr>
           <a:xfrm>
             <a:off x="0" y="1685880"/>
-            <a:ext cx="9143640" cy="108360"/>
+            <a:ext cx="9143280" cy="108000"/>
           </a:xfrm>
           <a:prstGeom prst="rect">
             <a:avLst/>
@@ -4648,7 +4657,7 @@
           <a:fontRef idx="minor"/>
         </p:style>
         <p:txBody>
-          <a:bodyPr tIns="54360" bIns="54360" anchor="ctr">
+          <a:bodyPr lIns="90000" rIns="90000" tIns="54000" bIns="54000" anchor="ctr">
             <a:noAutofit/>
           </a:bodyPr>
           <a:p>
@@ -4662,6 +4671,7 @@
                 <a:srgbClr val="000000"/>
               </a:solidFill>
               <a:latin typeface="Arial"/>
+              <a:ea typeface="DejaVu Sans"/>
             </a:endParaRPr>
           </a:p>
         </p:txBody>
@@ -4679,18 +4689,18 @@
         <p:spPr>
           <a:xfrm>
             <a:off x="471960" y="738720"/>
-            <a:ext cx="8221680" cy="767160"/>
-          </a:xfrm>
-          <a:prstGeom prst="rect">
-            <a:avLst/>
-          </a:prstGeom>
-          <a:noFill/>
-          <a:ln w="0">
-            <a:noFill/>
-          </a:ln>
-        </p:spPr>
-        <p:txBody>
-          <a:bodyPr tIns="91440" bIns="91440" anchor="b">
+            <a:ext cx="8221320" cy="766800"/>
+          </a:xfrm>
+          <a:prstGeom prst="rect">
+            <a:avLst/>
+          </a:prstGeom>
+          <a:noFill/>
+          <a:ln w="0">
+            <a:noFill/>
+          </a:ln>
+        </p:spPr>
+        <p:txBody>
+          <a:bodyPr lIns="0" rIns="0" tIns="0" bIns="0" anchor="ctr">
             <a:noAutofit/>
           </a:bodyPr>
           <a:p>
@@ -4698,7 +4708,7 @@
               <a:buNone/>
             </a:pPr>
             <a:r>
-              <a:rPr b="0" lang="it-IT" sz="3200" spc="-1" strike="noStrike">
+              <a:rPr b="0" lang="it-IT" sz="1800" spc="-1" strike="noStrike">
                 <a:solidFill>
                   <a:srgbClr val="000000"/>
                 </a:solidFill>
@@ -4706,7 +4716,7 @@
               </a:rPr>
               <a:t>Fai clic per modificare il formato del testo del titolo</a:t>
             </a:r>
-            <a:endParaRPr b="0" lang="it-IT" sz="3200" spc="-1" strike="noStrike">
+            <a:endParaRPr b="0" lang="it-IT" sz="1800" spc="-1" strike="noStrike">
               <a:solidFill>
                 <a:srgbClr val="000000"/>
               </a:solidFill>
@@ -4728,19 +4738,19 @@
         <p:spPr>
           <a:xfrm>
             <a:off x="471960" y="1919160"/>
-            <a:ext cx="8221680" cy="2709720"/>
-          </a:xfrm>
-          <a:prstGeom prst="rect">
-            <a:avLst/>
-          </a:prstGeom>
-          <a:noFill/>
-          <a:ln w="0">
-            <a:noFill/>
-          </a:ln>
-        </p:spPr>
-        <p:txBody>
-          <a:bodyPr tIns="91440" bIns="91440" anchor="t">
-            <a:noAutofit/>
+            <a:ext cx="8221320" cy="2709360"/>
+          </a:xfrm>
+          <a:prstGeom prst="rect">
+            <a:avLst/>
+          </a:prstGeom>
+          <a:noFill/>
+          <a:ln w="0">
+            <a:noFill/>
+          </a:ln>
+        </p:spPr>
+        <p:txBody>
+          <a:bodyPr lIns="0" rIns="0" tIns="0" bIns="0" anchor="t">
+            <a:normAutofit/>
           </a:bodyPr>
           <a:p>
             <a:pPr marL="432000" indent="-324000">
@@ -4953,18 +4963,18 @@
         <p:spPr>
           <a:xfrm>
             <a:off x="8523720" y="4695480"/>
-            <a:ext cx="548280" cy="393120"/>
-          </a:xfrm>
-          <a:prstGeom prst="rect">
-            <a:avLst/>
-          </a:prstGeom>
-          <a:noFill/>
-          <a:ln w="0">
-            <a:noFill/>
-          </a:ln>
-        </p:spPr>
-        <p:txBody>
-          <a:bodyPr tIns="91440" bIns="91440" anchor="ctr">
+            <a:ext cx="547920" cy="392760"/>
+          </a:xfrm>
+          <a:prstGeom prst="rect">
+            <a:avLst/>
+          </a:prstGeom>
+          <a:noFill/>
+          <a:ln w="0">
+            <a:noFill/>
+          </a:ln>
+        </p:spPr>
+        <p:txBody>
+          <a:bodyPr lIns="90000" rIns="90000" tIns="91440" bIns="91440" anchor="ctr">
             <a:noAutofit/>
           </a:bodyPr>
           <a:lstStyle>
@@ -4973,6 +4983,9 @@
                 <a:spcPct val="100000"/>
               </a:lnSpc>
               <a:buNone/>
+              <a:tabLst>
+                <a:tab algn="l" pos="0"/>
+              </a:tabLst>
               <a:defRPr b="0" lang="it" sz="1400" spc="-1" strike="noStrike">
                 <a:solidFill>
                   <a:srgbClr val="000000"/>
@@ -4988,8 +5001,11 @@
                 <a:spcPct val="100000"/>
               </a:lnSpc>
               <a:buNone/>
-            </a:pPr>
-            <a:fld id="{D3C00ABD-2761-45A7-8D68-FBE5A0F8BC90}" type="slidenum">
+              <a:tabLst>
+                <a:tab algn="l" pos="0"/>
+              </a:tabLst>
+            </a:pPr>
+            <a:fld id="{25E6BE77-5847-486D-B90C-C4595999956D}" type="slidenum">
               <a:rPr b="0" lang="it" sz="1400" spc="-1" strike="noStrike">
                 <a:solidFill>
                   <a:srgbClr val="000000"/>
@@ -5058,18 +5074,18 @@
         <p:spPr>
           <a:xfrm>
             <a:off x="390600" y="1819440"/>
-            <a:ext cx="8221680" cy="933120"/>
-          </a:xfrm>
-          <a:prstGeom prst="rect">
-            <a:avLst/>
-          </a:prstGeom>
-          <a:noFill/>
-          <a:ln w="0">
-            <a:noFill/>
-          </a:ln>
-        </p:spPr>
-        <p:txBody>
-          <a:bodyPr tIns="91440" bIns="91440" anchor="b">
+            <a:ext cx="8221320" cy="932760"/>
+          </a:xfrm>
+          <a:prstGeom prst="rect">
+            <a:avLst/>
+          </a:prstGeom>
+          <a:noFill/>
+          <a:ln w="0">
+            <a:noFill/>
+          </a:ln>
+        </p:spPr>
+        <p:txBody>
+          <a:bodyPr lIns="0" rIns="0" tIns="91440" bIns="91440" anchor="b">
             <a:noAutofit/>
           </a:bodyPr>
           <a:p>
@@ -5078,6 +5094,9 @@
                 <a:spcPct val="100000"/>
               </a:lnSpc>
               <a:buNone/>
+              <a:tabLst>
+                <a:tab algn="l" pos="0"/>
+              </a:tabLst>
             </a:pPr>
             <a:r>
               <a:rPr b="0" lang="it" sz="4800" spc="-1" strike="noStrike">
@@ -5111,18 +5130,18 @@
         <p:spPr>
           <a:xfrm>
             <a:off x="390600" y="2789280"/>
-            <a:ext cx="8221680" cy="432360"/>
-          </a:xfrm>
-          <a:prstGeom prst="rect">
-            <a:avLst/>
-          </a:prstGeom>
-          <a:noFill/>
-          <a:ln w="0">
-            <a:noFill/>
-          </a:ln>
-        </p:spPr>
-        <p:txBody>
-          <a:bodyPr tIns="91440" bIns="91440" anchor="t">
+            <a:ext cx="8221320" cy="432000"/>
+          </a:xfrm>
+          <a:prstGeom prst="rect">
+            <a:avLst/>
+          </a:prstGeom>
+          <a:noFill/>
+          <a:ln w="0">
+            <a:noFill/>
+          </a:ln>
+        </p:spPr>
+        <p:txBody>
+          <a:bodyPr lIns="0" rIns="0" tIns="91440" bIns="91440" anchor="t">
             <a:noAutofit/>
           </a:bodyPr>
           <a:p>
@@ -5131,6 +5150,9 @@
                 <a:spcPct val="100000"/>
               </a:lnSpc>
               <a:buNone/>
+              <a:tabLst>
+                <a:tab algn="l" pos="0"/>
+              </a:tabLst>
             </a:pPr>
             <a:r>
               <a:rPr b="0" lang="it" sz="1800" spc="-1" strike="noStrike">
@@ -5155,6 +5177,9 @@
                 <a:spcPct val="100000"/>
               </a:lnSpc>
               <a:buNone/>
+              <a:tabLst>
+                <a:tab algn="l" pos="0"/>
+              </a:tabLst>
             </a:pPr>
             <a:endParaRPr b="0" lang="it-IT" sz="1800" spc="-1" strike="noStrike">
               <a:solidFill>
@@ -5169,6 +5194,9 @@
                 <a:spcPct val="100000"/>
               </a:lnSpc>
               <a:buNone/>
+              <a:tabLst>
+                <a:tab algn="l" pos="0"/>
+              </a:tabLst>
             </a:pPr>
             <a:endParaRPr b="0" lang="it-IT" sz="1800" spc="-1" strike="noStrike">
               <a:solidFill>
@@ -5183,6 +5211,9 @@
                 <a:spcPct val="100000"/>
               </a:lnSpc>
               <a:buNone/>
+              <a:tabLst>
+                <a:tab algn="l" pos="0"/>
+              </a:tabLst>
             </a:pPr>
             <a:endParaRPr b="0" lang="it-IT" sz="1800" spc="-1" strike="noStrike">
               <a:solidFill>
@@ -5197,6 +5228,9 @@
                 <a:spcPct val="100000"/>
               </a:lnSpc>
               <a:buNone/>
+              <a:tabLst>
+                <a:tab algn="l" pos="0"/>
+              </a:tabLst>
             </a:pPr>
             <a:endParaRPr b="0" lang="it-IT" sz="1800" spc="-1" strike="noStrike">
               <a:solidFill>
@@ -5211,6 +5245,9 @@
                 <a:spcPct val="100000"/>
               </a:lnSpc>
               <a:buNone/>
+              <a:tabLst>
+                <a:tab algn="l" pos="0"/>
+              </a:tabLst>
             </a:pPr>
             <a:endParaRPr b="0" lang="it-IT" sz="1800" spc="-1" strike="noStrike">
               <a:solidFill>
@@ -5225,6 +5262,9 @@
                 <a:spcPct val="100000"/>
               </a:lnSpc>
               <a:buNone/>
+              <a:tabLst>
+                <a:tab algn="l" pos="0"/>
+              </a:tabLst>
             </a:pPr>
             <a:endParaRPr b="0" lang="it-IT" sz="1800" spc="-1" strike="noStrike">
               <a:solidFill>
@@ -5239,6 +5279,9 @@
                 <a:spcPct val="100000"/>
               </a:lnSpc>
               <a:buNone/>
+              <a:tabLst>
+                <a:tab algn="l" pos="0"/>
+              </a:tabLst>
             </a:pPr>
             <a:r>
               <a:rPr b="0" lang="it" sz="1400" spc="-1" strike="noStrike">
@@ -5281,6 +5324,14 @@
       </p:sp>
     </p:spTree>
   </p:cSld>
+  <mc:AlternateContent>
+    <mc:Choice Requires="p14">
+      <p:transition spd="slow" p14:dur="2000"/>
+    </mc:Choice>
+    <mc:Fallback>
+      <p:transition spd="slow"/>
+    </mc:Fallback>
+  </mc:AlternateContent>
 </p:sld>
 </file>
 
@@ -5314,18 +5365,18 @@
         <p:spPr>
           <a:xfrm>
             <a:off x="471960" y="738720"/>
-            <a:ext cx="8221680" cy="767160"/>
-          </a:xfrm>
-          <a:prstGeom prst="rect">
-            <a:avLst/>
-          </a:prstGeom>
-          <a:noFill/>
-          <a:ln w="0">
-            <a:noFill/>
-          </a:ln>
-        </p:spPr>
-        <p:txBody>
-          <a:bodyPr tIns="91440" bIns="91440" anchor="b">
+            <a:ext cx="8221320" cy="766800"/>
+          </a:xfrm>
+          <a:prstGeom prst="rect">
+            <a:avLst/>
+          </a:prstGeom>
+          <a:noFill/>
+          <a:ln w="0">
+            <a:noFill/>
+          </a:ln>
+        </p:spPr>
+        <p:txBody>
+          <a:bodyPr lIns="0" rIns="0" tIns="91440" bIns="91440" anchor="b">
             <a:noAutofit/>
           </a:bodyPr>
           <a:p>
@@ -5334,6 +5385,9 @@
                 <a:spcPct val="100000"/>
               </a:lnSpc>
               <a:buNone/>
+              <a:tabLst>
+                <a:tab algn="l" pos="0"/>
+              </a:tabLst>
             </a:pPr>
             <a:r>
               <a:rPr b="0" lang="it" sz="3200" spc="-1" strike="noStrike">
@@ -5367,18 +5421,18 @@
         <p:spPr>
           <a:xfrm>
             <a:off x="471960" y="1919160"/>
-            <a:ext cx="8221680" cy="2709720"/>
-          </a:xfrm>
-          <a:prstGeom prst="rect">
-            <a:avLst/>
-          </a:prstGeom>
-          <a:noFill/>
-          <a:ln w="0">
-            <a:noFill/>
-          </a:ln>
-        </p:spPr>
-        <p:txBody>
-          <a:bodyPr tIns="91440" bIns="91440" anchor="t">
+            <a:ext cx="8221320" cy="2709360"/>
+          </a:xfrm>
+          <a:prstGeom prst="rect">
+            <a:avLst/>
+          </a:prstGeom>
+          <a:noFill/>
+          <a:ln w="0">
+            <a:noFill/>
+          </a:ln>
+        </p:spPr>
+        <p:txBody>
+          <a:bodyPr lIns="0" rIns="0" tIns="91440" bIns="91440" anchor="t">
             <a:noAutofit/>
           </a:bodyPr>
           <a:p>
@@ -5390,6 +5444,9 @@
                 <a:spcPts val="1599"/>
               </a:spcAft>
               <a:buNone/>
+              <a:tabLst>
+                <a:tab algn="l" pos="0"/>
+              </a:tabLst>
             </a:pPr>
             <a:r>
               <a:rPr b="0" lang="it" sz="1800" spc="-1" strike="noStrike">
@@ -5417,6 +5474,9 @@
                 <a:spcPts val="1599"/>
               </a:spcAft>
               <a:buNone/>
+              <a:tabLst>
+                <a:tab algn="l" pos="0"/>
+              </a:tabLst>
             </a:pPr>
             <a:r>
               <a:rPr b="0" lang="it" sz="1800" spc="-1" strike="noStrike">
@@ -5439,6 +5499,14 @@
       </p:sp>
     </p:spTree>
   </p:cSld>
+  <mc:AlternateContent>
+    <mc:Choice Requires="p14">
+      <p:transition spd="slow" p14:dur="2000"/>
+    </mc:Choice>
+    <mc:Fallback>
+      <p:transition spd="slow"/>
+    </mc:Fallback>
+  </mc:AlternateContent>
 </p:sld>
 </file>
 
@@ -5472,18 +5540,18 @@
         <p:spPr>
           <a:xfrm>
             <a:off x="471960" y="738720"/>
-            <a:ext cx="8221680" cy="767160"/>
-          </a:xfrm>
-          <a:prstGeom prst="rect">
-            <a:avLst/>
-          </a:prstGeom>
-          <a:noFill/>
-          <a:ln w="0">
-            <a:noFill/>
-          </a:ln>
-        </p:spPr>
-        <p:txBody>
-          <a:bodyPr tIns="91440" bIns="91440" anchor="b">
+            <a:ext cx="8221320" cy="766800"/>
+          </a:xfrm>
+          <a:prstGeom prst="rect">
+            <a:avLst/>
+          </a:prstGeom>
+          <a:noFill/>
+          <a:ln w="0">
+            <a:noFill/>
+          </a:ln>
+        </p:spPr>
+        <p:txBody>
+          <a:bodyPr lIns="0" rIns="0" tIns="91440" bIns="91440" anchor="b">
             <a:noAutofit/>
           </a:bodyPr>
           <a:p>
@@ -5492,6 +5560,9 @@
                 <a:spcPct val="100000"/>
               </a:lnSpc>
               <a:buNone/>
+              <a:tabLst>
+                <a:tab algn="l" pos="0"/>
+              </a:tabLst>
             </a:pPr>
             <a:r>
               <a:rPr b="0" lang="it" sz="3200" spc="-1" strike="noStrike">
@@ -5525,18 +5596,18 @@
         <p:spPr>
           <a:xfrm>
             <a:off x="471960" y="1919160"/>
-            <a:ext cx="8221680" cy="2709720"/>
-          </a:xfrm>
-          <a:prstGeom prst="rect">
-            <a:avLst/>
-          </a:prstGeom>
-          <a:noFill/>
-          <a:ln w="0">
-            <a:noFill/>
-          </a:ln>
-        </p:spPr>
-        <p:txBody>
-          <a:bodyPr tIns="91440" bIns="91440" anchor="t">
+            <a:ext cx="8221320" cy="2709360"/>
+          </a:xfrm>
+          <a:prstGeom prst="rect">
+            <a:avLst/>
+          </a:prstGeom>
+          <a:noFill/>
+          <a:ln w="0">
+            <a:noFill/>
+          </a:ln>
+        </p:spPr>
+        <p:txBody>
+          <a:bodyPr lIns="0" rIns="0" tIns="91440" bIns="91440" anchor="t">
             <a:noAutofit/>
           </a:bodyPr>
           <a:p>
@@ -5548,6 +5619,9 @@
                 <a:spcPts val="1599"/>
               </a:spcAft>
               <a:buNone/>
+              <a:tabLst>
+                <a:tab algn="l" pos="0"/>
+              </a:tabLst>
             </a:pPr>
             <a:endParaRPr b="0" lang="it-IT" sz="1000" spc="-1" strike="noStrike">
               <a:solidFill>
@@ -5565,6 +5639,9 @@
                 <a:spcPts val="1599"/>
               </a:spcAft>
               <a:buNone/>
+              <a:tabLst>
+                <a:tab algn="l" pos="0"/>
+              </a:tabLst>
             </a:pPr>
             <a:r>
               <a:rPr b="0" lang="it" sz="4800" spc="-1" strike="noStrike">
@@ -5592,6 +5669,9 @@
                 <a:spcPts val="1599"/>
               </a:spcAft>
               <a:buNone/>
+              <a:tabLst>
+                <a:tab algn="l" pos="0"/>
+              </a:tabLst>
             </a:pPr>
             <a:endParaRPr b="0" lang="it-IT" sz="1800" spc="-1" strike="noStrike">
               <a:solidFill>
@@ -5604,6 +5684,14 @@
       </p:sp>
     </p:spTree>
   </p:cSld>
+  <mc:AlternateContent>
+    <mc:Choice Requires="p14">
+      <p:transition spd="slow" p14:dur="2000"/>
+    </mc:Choice>
+    <mc:Fallback>
+      <p:transition spd="slow"/>
+    </mc:Fallback>
+  </mc:AlternateContent>
 </p:sld>
 </file>
 
@@ -5637,18 +5725,18 @@
         <p:spPr>
           <a:xfrm>
             <a:off x="471960" y="738720"/>
-            <a:ext cx="8221680" cy="767160"/>
-          </a:xfrm>
-          <a:prstGeom prst="rect">
-            <a:avLst/>
-          </a:prstGeom>
-          <a:noFill/>
-          <a:ln w="0">
-            <a:noFill/>
-          </a:ln>
-        </p:spPr>
-        <p:txBody>
-          <a:bodyPr tIns="91440" bIns="91440" anchor="b">
+            <a:ext cx="8221320" cy="766800"/>
+          </a:xfrm>
+          <a:prstGeom prst="rect">
+            <a:avLst/>
+          </a:prstGeom>
+          <a:noFill/>
+          <a:ln w="0">
+            <a:noFill/>
+          </a:ln>
+        </p:spPr>
+        <p:txBody>
+          <a:bodyPr lIns="0" rIns="0" tIns="91440" bIns="91440" anchor="b">
             <a:noAutofit/>
           </a:bodyPr>
           <a:p>
@@ -5657,6 +5745,9 @@
                 <a:spcPct val="100000"/>
               </a:lnSpc>
               <a:buNone/>
+              <a:tabLst>
+                <a:tab algn="l" pos="0"/>
+              </a:tabLst>
             </a:pPr>
             <a:r>
               <a:rPr b="0" lang="it" sz="3200" spc="-1" strike="noStrike">
@@ -5690,18 +5781,18 @@
         <p:spPr>
           <a:xfrm>
             <a:off x="471960" y="1919160"/>
-            <a:ext cx="8221680" cy="2709720"/>
-          </a:xfrm>
-          <a:prstGeom prst="rect">
-            <a:avLst/>
-          </a:prstGeom>
-          <a:noFill/>
-          <a:ln w="0">
-            <a:noFill/>
-          </a:ln>
-        </p:spPr>
-        <p:txBody>
-          <a:bodyPr tIns="91440" bIns="91440" anchor="t">
+            <a:ext cx="8221320" cy="2709360"/>
+          </a:xfrm>
+          <a:prstGeom prst="rect">
+            <a:avLst/>
+          </a:prstGeom>
+          <a:noFill/>
+          <a:ln w="0">
+            <a:noFill/>
+          </a:ln>
+        </p:spPr>
+        <p:txBody>
+          <a:bodyPr lIns="0" rIns="0" tIns="91440" bIns="91440" anchor="t">
             <a:noAutofit/>
           </a:bodyPr>
           <a:p>
@@ -5713,6 +5804,9 @@
                 <a:spcPts val="1599"/>
               </a:spcAft>
               <a:buNone/>
+              <a:tabLst>
+                <a:tab algn="l" pos="0"/>
+              </a:tabLst>
             </a:pPr>
             <a:r>
               <a:rPr b="0" lang="it" sz="1800" spc="-1" strike="noStrike">
@@ -5740,6 +5834,9 @@
                 <a:spcPts val="1599"/>
               </a:spcAft>
               <a:buNone/>
+              <a:tabLst>
+                <a:tab algn="l" pos="0"/>
+              </a:tabLst>
             </a:pPr>
             <a:r>
               <a:rPr b="0" lang="it" sz="1800" spc="-1" strike="noStrike">
@@ -5762,6 +5859,14 @@
       </p:sp>
     </p:spTree>
   </p:cSld>
+  <mc:AlternateContent>
+    <mc:Choice Requires="p14">
+      <p:transition spd="slow" p14:dur="2000"/>
+    </mc:Choice>
+    <mc:Fallback>
+      <p:transition spd="slow"/>
+    </mc:Fallback>
+  </mc:AlternateContent>
 </p:sld>
 </file>
 
@@ -5795,18 +5900,18 @@
         <p:spPr>
           <a:xfrm>
             <a:off x="471960" y="738720"/>
-            <a:ext cx="8221680" cy="767160"/>
-          </a:xfrm>
-          <a:prstGeom prst="rect">
-            <a:avLst/>
-          </a:prstGeom>
-          <a:noFill/>
-          <a:ln w="0">
-            <a:noFill/>
-          </a:ln>
-        </p:spPr>
-        <p:txBody>
-          <a:bodyPr tIns="91440" bIns="91440" anchor="b">
+            <a:ext cx="8221320" cy="766800"/>
+          </a:xfrm>
+          <a:prstGeom prst="rect">
+            <a:avLst/>
+          </a:prstGeom>
+          <a:noFill/>
+          <a:ln w="0">
+            <a:noFill/>
+          </a:ln>
+        </p:spPr>
+        <p:txBody>
+          <a:bodyPr lIns="0" rIns="0" tIns="91440" bIns="91440" anchor="b">
             <a:noAutofit/>
           </a:bodyPr>
           <a:p>
@@ -5815,6 +5920,9 @@
                 <a:spcPct val="100000"/>
               </a:lnSpc>
               <a:buNone/>
+              <a:tabLst>
+                <a:tab algn="l" pos="0"/>
+              </a:tabLst>
             </a:pPr>
             <a:r>
               <a:rPr b="0" lang="it" sz="3200" spc="-1" strike="noStrike">
@@ -5848,18 +5956,18 @@
         <p:spPr>
           <a:xfrm>
             <a:off x="471960" y="1919160"/>
-            <a:ext cx="8221680" cy="2709720"/>
-          </a:xfrm>
-          <a:prstGeom prst="rect">
-            <a:avLst/>
-          </a:prstGeom>
-          <a:noFill/>
-          <a:ln w="0">
-            <a:noFill/>
-          </a:ln>
-        </p:spPr>
-        <p:txBody>
-          <a:bodyPr tIns="91440" bIns="91440" anchor="t">
+            <a:ext cx="8221320" cy="2709360"/>
+          </a:xfrm>
+          <a:prstGeom prst="rect">
+            <a:avLst/>
+          </a:prstGeom>
+          <a:noFill/>
+          <a:ln w="0">
+            <a:noFill/>
+          </a:ln>
+        </p:spPr>
+        <p:txBody>
+          <a:bodyPr lIns="0" rIns="0" tIns="91440" bIns="91440" anchor="t">
             <a:noAutofit/>
           </a:bodyPr>
           <a:p>
@@ -5871,6 +5979,9 @@
                 <a:spcPts val="1599"/>
               </a:spcAft>
               <a:buNone/>
+              <a:tabLst>
+                <a:tab algn="l" pos="0"/>
+              </a:tabLst>
             </a:pPr>
             <a:r>
               <a:rPr b="0" lang="it" sz="1800" spc="-1" strike="noStrike">
@@ -5898,6 +6009,9 @@
                 <a:spcPts val="1599"/>
               </a:spcAft>
               <a:buNone/>
+              <a:tabLst>
+                <a:tab algn="l" pos="0"/>
+              </a:tabLst>
             </a:pPr>
             <a:r>
               <a:rPr b="0" lang="it" sz="1800" spc="-1" strike="noStrike">
@@ -5925,6 +6039,9 @@
                 <a:spcPts val="1599"/>
               </a:spcAft>
               <a:buNone/>
+              <a:tabLst>
+                <a:tab algn="l" pos="0"/>
+              </a:tabLst>
             </a:pPr>
             <a:endParaRPr b="0" lang="it-IT" sz="1800" spc="-1" strike="noStrike">
               <a:solidFill>
@@ -5937,6 +6054,14 @@
       </p:sp>
     </p:spTree>
   </p:cSld>
+  <mc:AlternateContent>
+    <mc:Choice Requires="p14">
+      <p:transition spd="slow" p14:dur="2000"/>
+    </mc:Choice>
+    <mc:Fallback>
+      <p:transition spd="slow"/>
+    </mc:Fallback>
+  </mc:AlternateContent>
 </p:sld>
 </file>
 
@@ -5970,18 +6095,18 @@
         <p:spPr>
           <a:xfrm>
             <a:off x="471960" y="738720"/>
-            <a:ext cx="8221680" cy="767160"/>
-          </a:xfrm>
-          <a:prstGeom prst="rect">
-            <a:avLst/>
-          </a:prstGeom>
-          <a:noFill/>
-          <a:ln w="0">
-            <a:noFill/>
-          </a:ln>
-        </p:spPr>
-        <p:txBody>
-          <a:bodyPr tIns="91440" bIns="91440" anchor="b">
+            <a:ext cx="8221320" cy="766800"/>
+          </a:xfrm>
+          <a:prstGeom prst="rect">
+            <a:avLst/>
+          </a:prstGeom>
+          <a:noFill/>
+          <a:ln w="0">
+            <a:noFill/>
+          </a:ln>
+        </p:spPr>
+        <p:txBody>
+          <a:bodyPr lIns="0" rIns="0" tIns="91440" bIns="91440" anchor="b">
             <a:noAutofit/>
           </a:bodyPr>
           <a:p>
@@ -5990,6 +6115,9 @@
                 <a:spcPct val="100000"/>
               </a:lnSpc>
               <a:buNone/>
+              <a:tabLst>
+                <a:tab algn="l" pos="0"/>
+              </a:tabLst>
             </a:pPr>
             <a:r>
               <a:rPr b="0" lang="it" sz="3200" spc="-1" strike="noStrike">
@@ -6023,18 +6151,18 @@
         <p:spPr>
           <a:xfrm>
             <a:off x="471960" y="1919160"/>
-            <a:ext cx="8221680" cy="2709720"/>
-          </a:xfrm>
-          <a:prstGeom prst="rect">
-            <a:avLst/>
-          </a:prstGeom>
-          <a:noFill/>
-          <a:ln w="0">
-            <a:noFill/>
-          </a:ln>
-        </p:spPr>
-        <p:txBody>
-          <a:bodyPr tIns="91440" bIns="91440" anchor="t">
+            <a:ext cx="8221320" cy="2709360"/>
+          </a:xfrm>
+          <a:prstGeom prst="rect">
+            <a:avLst/>
+          </a:prstGeom>
+          <a:noFill/>
+          <a:ln w="0">
+            <a:noFill/>
+          </a:ln>
+        </p:spPr>
+        <p:txBody>
+          <a:bodyPr lIns="0" rIns="0" tIns="91440" bIns="91440" anchor="t">
             <a:noAutofit/>
           </a:bodyPr>
           <a:p>
@@ -6046,6 +6174,9 @@
                 <a:spcPts val="1599"/>
               </a:spcAft>
               <a:buNone/>
+              <a:tabLst>
+                <a:tab algn="l" pos="0"/>
+              </a:tabLst>
             </a:pPr>
             <a:r>
               <a:rPr b="0" lang="it" sz="1800" spc="-1" strike="noStrike">
@@ -6073,6 +6204,9 @@
                 <a:spcPts val="1599"/>
               </a:spcAft>
               <a:buNone/>
+              <a:tabLst>
+                <a:tab algn="l" pos="0"/>
+              </a:tabLst>
             </a:pPr>
             <a:r>
               <a:rPr b="0" lang="it" sz="1800" spc="-1" strike="noStrike">
@@ -6100,6 +6234,9 @@
                 <a:spcPts val="1599"/>
               </a:spcAft>
               <a:buNone/>
+              <a:tabLst>
+                <a:tab algn="l" pos="0"/>
+              </a:tabLst>
             </a:pPr>
             <a:r>
               <a:rPr b="0" lang="it" sz="1800" spc="-1" strike="noStrike">
@@ -6127,6 +6264,9 @@
                 <a:spcPts val="1599"/>
               </a:spcAft>
               <a:buNone/>
+              <a:tabLst>
+                <a:tab algn="l" pos="0"/>
+              </a:tabLst>
             </a:pPr>
             <a:r>
               <a:rPr b="0" lang="it" sz="1800" spc="-1" strike="noStrike">
@@ -6154,6 +6294,9 @@
                 <a:spcPts val="1599"/>
               </a:spcAft>
               <a:buNone/>
+              <a:tabLst>
+                <a:tab algn="l" pos="0"/>
+              </a:tabLst>
             </a:pPr>
             <a:r>
               <a:rPr b="0" lang="it" sz="1800" spc="-1" strike="noStrike">
@@ -6176,6 +6319,14 @@
       </p:sp>
     </p:spTree>
   </p:cSld>
+  <mc:AlternateContent>
+    <mc:Choice Requires="p14">
+      <p:transition spd="slow" p14:dur="2000"/>
+    </mc:Choice>
+    <mc:Fallback>
+      <p:transition spd="slow"/>
+    </mc:Fallback>
+  </mc:AlternateContent>
 </p:sld>
 </file>
 
@@ -6209,18 +6360,18 @@
         <p:spPr>
           <a:xfrm>
             <a:off x="471960" y="738720"/>
-            <a:ext cx="8221680" cy="767160"/>
-          </a:xfrm>
-          <a:prstGeom prst="rect">
-            <a:avLst/>
-          </a:prstGeom>
-          <a:noFill/>
-          <a:ln w="0">
-            <a:noFill/>
-          </a:ln>
-        </p:spPr>
-        <p:txBody>
-          <a:bodyPr tIns="91440" bIns="91440" anchor="b">
+            <a:ext cx="8221320" cy="766800"/>
+          </a:xfrm>
+          <a:prstGeom prst="rect">
+            <a:avLst/>
+          </a:prstGeom>
+          <a:noFill/>
+          <a:ln w="0">
+            <a:noFill/>
+          </a:ln>
+        </p:spPr>
+        <p:txBody>
+          <a:bodyPr lIns="0" rIns="0" tIns="91440" bIns="91440" anchor="b">
             <a:noAutofit/>
           </a:bodyPr>
           <a:p>
@@ -6229,6 +6380,9 @@
                 <a:spcPct val="100000"/>
               </a:lnSpc>
               <a:buNone/>
+              <a:tabLst>
+                <a:tab algn="l" pos="0"/>
+              </a:tabLst>
             </a:pPr>
             <a:r>
               <a:rPr b="0" lang="it" sz="3200" spc="-1" strike="noStrike">
@@ -6262,18 +6416,18 @@
         <p:spPr>
           <a:xfrm>
             <a:off x="471960" y="1919160"/>
-            <a:ext cx="8221680" cy="2709720"/>
-          </a:xfrm>
-          <a:prstGeom prst="rect">
-            <a:avLst/>
-          </a:prstGeom>
-          <a:noFill/>
-          <a:ln w="0">
-            <a:noFill/>
-          </a:ln>
-        </p:spPr>
-        <p:txBody>
-          <a:bodyPr tIns="91440" bIns="91440" anchor="t">
+            <a:ext cx="8221320" cy="2709360"/>
+          </a:xfrm>
+          <a:prstGeom prst="rect">
+            <a:avLst/>
+          </a:prstGeom>
+          <a:noFill/>
+          <a:ln w="0">
+            <a:noFill/>
+          </a:ln>
+        </p:spPr>
+        <p:txBody>
+          <a:bodyPr lIns="0" rIns="0" tIns="91440" bIns="91440" anchor="t">
             <a:noAutofit/>
           </a:bodyPr>
           <a:p>
@@ -6285,6 +6439,9 @@
                 <a:spcPts val="1599"/>
               </a:spcAft>
               <a:buNone/>
+              <a:tabLst>
+                <a:tab algn="l" pos="0"/>
+              </a:tabLst>
             </a:pPr>
             <a:r>
               <a:rPr b="0" lang="it" sz="1800" spc="-1" strike="noStrike">
@@ -6312,6 +6469,9 @@
                 <a:spcPts val="1599"/>
               </a:spcAft>
               <a:buNone/>
+              <a:tabLst>
+                <a:tab algn="l" pos="0"/>
+              </a:tabLst>
             </a:pPr>
             <a:r>
               <a:rPr b="0" lang="it" sz="1800" spc="-1" strike="noStrike">
@@ -6339,6 +6499,9 @@
                 <a:spcPts val="1599"/>
               </a:spcAft>
               <a:buNone/>
+              <a:tabLst>
+                <a:tab algn="l" pos="0"/>
+              </a:tabLst>
             </a:pPr>
             <a:r>
               <a:rPr b="0" lang="it" sz="1800" spc="-1" strike="noStrike">
@@ -6366,6 +6529,9 @@
                 <a:spcPts val="1599"/>
               </a:spcAft>
               <a:buNone/>
+              <a:tabLst>
+                <a:tab algn="l" pos="0"/>
+              </a:tabLst>
             </a:pPr>
             <a:endParaRPr b="0" lang="it-IT" sz="1800" spc="-1" strike="noStrike">
               <a:solidFill>
@@ -6378,6 +6544,14 @@
       </p:sp>
     </p:spTree>
   </p:cSld>
+  <mc:AlternateContent>
+    <mc:Choice Requires="p14">
+      <p:transition spd="slow" p14:dur="2000"/>
+    </mc:Choice>
+    <mc:Fallback>
+      <p:transition spd="slow"/>
+    </mc:Fallback>
+  </mc:AlternateContent>
 </p:sld>
 </file>
 
@@ -6411,18 +6585,18 @@
         <p:spPr>
           <a:xfrm>
             <a:off x="471960" y="738720"/>
-            <a:ext cx="8221680" cy="767160"/>
-          </a:xfrm>
-          <a:prstGeom prst="rect">
-            <a:avLst/>
-          </a:prstGeom>
-          <a:noFill/>
-          <a:ln w="0">
-            <a:noFill/>
-          </a:ln>
-        </p:spPr>
-        <p:txBody>
-          <a:bodyPr tIns="91440" bIns="91440" anchor="b">
+            <a:ext cx="8221320" cy="766800"/>
+          </a:xfrm>
+          <a:prstGeom prst="rect">
+            <a:avLst/>
+          </a:prstGeom>
+          <a:noFill/>
+          <a:ln w="0">
+            <a:noFill/>
+          </a:ln>
+        </p:spPr>
+        <p:txBody>
+          <a:bodyPr lIns="0" rIns="0" tIns="91440" bIns="91440" anchor="b">
             <a:noAutofit/>
           </a:bodyPr>
           <a:p>
@@ -6431,6 +6605,9 @@
                 <a:spcPct val="100000"/>
               </a:lnSpc>
               <a:buNone/>
+              <a:tabLst>
+                <a:tab algn="l" pos="0"/>
+              </a:tabLst>
             </a:pPr>
             <a:r>
               <a:rPr b="0" lang="it" sz="3200" spc="-1" strike="noStrike">
@@ -6464,18 +6641,18 @@
         <p:spPr>
           <a:xfrm>
             <a:off x="471960" y="1919160"/>
-            <a:ext cx="8221680" cy="2709720"/>
-          </a:xfrm>
-          <a:prstGeom prst="rect">
-            <a:avLst/>
-          </a:prstGeom>
-          <a:noFill/>
-          <a:ln w="0">
-            <a:noFill/>
-          </a:ln>
-        </p:spPr>
-        <p:txBody>
-          <a:bodyPr tIns="91440" bIns="91440" anchor="t">
+            <a:ext cx="8221320" cy="2709360"/>
+          </a:xfrm>
+          <a:prstGeom prst="rect">
+            <a:avLst/>
+          </a:prstGeom>
+          <a:noFill/>
+          <a:ln w="0">
+            <a:noFill/>
+          </a:ln>
+        </p:spPr>
+        <p:txBody>
+          <a:bodyPr lIns="0" rIns="0" tIns="91440" bIns="91440" anchor="t">
             <a:noAutofit/>
           </a:bodyPr>
           <a:p>
@@ -6487,6 +6664,9 @@
                 <a:spcPts val="1599"/>
               </a:spcAft>
               <a:buNone/>
+              <a:tabLst>
+                <a:tab algn="l" pos="0"/>
+              </a:tabLst>
             </a:pPr>
             <a:r>
               <a:rPr b="0" lang="it" sz="1800" spc="-1" strike="noStrike">
@@ -6514,6 +6694,9 @@
                 <a:spcPts val="1599"/>
               </a:spcAft>
               <a:buNone/>
+              <a:tabLst>
+                <a:tab algn="l" pos="0"/>
+              </a:tabLst>
             </a:pPr>
             <a:r>
               <a:rPr b="0" lang="it" sz="1800" spc="-1" strike="noStrike">
@@ -6536,6 +6719,14 @@
       </p:sp>
     </p:spTree>
   </p:cSld>
+  <mc:AlternateContent>
+    <mc:Choice Requires="p14">
+      <p:transition spd="slow" p14:dur="2000"/>
+    </mc:Choice>
+    <mc:Fallback>
+      <p:transition spd="slow"/>
+    </mc:Fallback>
+  </mc:AlternateContent>
 </p:sld>
 </file>
 
@@ -6569,18 +6760,18 @@
         <p:spPr>
           <a:xfrm>
             <a:off x="471960" y="738720"/>
-            <a:ext cx="8221680" cy="767160"/>
-          </a:xfrm>
-          <a:prstGeom prst="rect">
-            <a:avLst/>
-          </a:prstGeom>
-          <a:noFill/>
-          <a:ln w="0">
-            <a:noFill/>
-          </a:ln>
-        </p:spPr>
-        <p:txBody>
-          <a:bodyPr tIns="91440" bIns="91440" anchor="b">
+            <a:ext cx="8221320" cy="766800"/>
+          </a:xfrm>
+          <a:prstGeom prst="rect">
+            <a:avLst/>
+          </a:prstGeom>
+          <a:noFill/>
+          <a:ln w="0">
+            <a:noFill/>
+          </a:ln>
+        </p:spPr>
+        <p:txBody>
+          <a:bodyPr lIns="0" rIns="0" tIns="91440" bIns="91440" anchor="b">
             <a:noAutofit/>
           </a:bodyPr>
           <a:p>
@@ -6589,6 +6780,9 @@
                 <a:spcPct val="100000"/>
               </a:lnSpc>
               <a:buNone/>
+              <a:tabLst>
+                <a:tab algn="l" pos="0"/>
+              </a:tabLst>
             </a:pPr>
             <a:r>
               <a:rPr b="0" lang="it" sz="3200" spc="-1" strike="noStrike">
@@ -6622,18 +6816,18 @@
         <p:spPr>
           <a:xfrm>
             <a:off x="471960" y="1919160"/>
-            <a:ext cx="8221680" cy="2709720"/>
-          </a:xfrm>
-          <a:prstGeom prst="rect">
-            <a:avLst/>
-          </a:prstGeom>
-          <a:noFill/>
-          <a:ln w="0">
-            <a:noFill/>
-          </a:ln>
-        </p:spPr>
-        <p:txBody>
-          <a:bodyPr tIns="91440" bIns="91440" anchor="t">
+            <a:ext cx="8221320" cy="2709360"/>
+          </a:xfrm>
+          <a:prstGeom prst="rect">
+            <a:avLst/>
+          </a:prstGeom>
+          <a:noFill/>
+          <a:ln w="0">
+            <a:noFill/>
+          </a:ln>
+        </p:spPr>
+        <p:txBody>
+          <a:bodyPr lIns="0" rIns="0" tIns="91440" bIns="91440" anchor="t">
             <a:noAutofit/>
           </a:bodyPr>
           <a:p>
@@ -6645,6 +6839,9 @@
                 <a:spcPts val="1599"/>
               </a:spcAft>
               <a:buNone/>
+              <a:tabLst>
+                <a:tab algn="l" pos="0"/>
+              </a:tabLst>
             </a:pPr>
             <a:r>
               <a:rPr b="0" lang="it" sz="1800" spc="-1" strike="noStrike">
@@ -6672,6 +6869,9 @@
                 <a:spcPts val="1599"/>
               </a:spcAft>
               <a:buNone/>
+              <a:tabLst>
+                <a:tab algn="l" pos="0"/>
+              </a:tabLst>
             </a:pPr>
             <a:r>
               <a:rPr b="0" lang="it" sz="1800" spc="-1" strike="noStrike">
@@ -6699,6 +6899,9 @@
                 <a:spcPts val="1599"/>
               </a:spcAft>
               <a:buNone/>
+              <a:tabLst>
+                <a:tab algn="l" pos="0"/>
+              </a:tabLst>
             </a:pPr>
             <a:r>
               <a:rPr b="0" lang="it" sz="1800" spc="-1" strike="noStrike">
@@ -6757,18 +6960,18 @@
         <p:spPr>
           <a:xfrm>
             <a:off x="471960" y="738720"/>
-            <a:ext cx="8221680" cy="767160"/>
-          </a:xfrm>
-          <a:prstGeom prst="rect">
-            <a:avLst/>
-          </a:prstGeom>
-          <a:noFill/>
-          <a:ln w="0">
-            <a:noFill/>
-          </a:ln>
-        </p:spPr>
-        <p:txBody>
-          <a:bodyPr tIns="91440" bIns="91440" anchor="b">
+            <a:ext cx="8221320" cy="766800"/>
+          </a:xfrm>
+          <a:prstGeom prst="rect">
+            <a:avLst/>
+          </a:prstGeom>
+          <a:noFill/>
+          <a:ln w="0">
+            <a:noFill/>
+          </a:ln>
+        </p:spPr>
+        <p:txBody>
+          <a:bodyPr lIns="0" rIns="0" tIns="91440" bIns="91440" anchor="b">
             <a:noAutofit/>
           </a:bodyPr>
           <a:p>
@@ -6777,6 +6980,9 @@
                 <a:spcPct val="100000"/>
               </a:lnSpc>
               <a:buNone/>
+              <a:tabLst>
+                <a:tab algn="l" pos="0"/>
+              </a:tabLst>
             </a:pPr>
             <a:r>
               <a:rPr b="0" lang="it" sz="3200" spc="-1" strike="noStrike">
@@ -6810,18 +7016,18 @@
         <p:spPr>
           <a:xfrm>
             <a:off x="471960" y="1919160"/>
-            <a:ext cx="8221680" cy="2709720"/>
-          </a:xfrm>
-          <a:prstGeom prst="rect">
-            <a:avLst/>
-          </a:prstGeom>
-          <a:noFill/>
-          <a:ln w="0">
-            <a:noFill/>
-          </a:ln>
-        </p:spPr>
-        <p:txBody>
-          <a:bodyPr tIns="91440" bIns="91440" anchor="t">
+            <a:ext cx="8221320" cy="2709360"/>
+          </a:xfrm>
+          <a:prstGeom prst="rect">
+            <a:avLst/>
+          </a:prstGeom>
+          <a:noFill/>
+          <a:ln w="0">
+            <a:noFill/>
+          </a:ln>
+        </p:spPr>
+        <p:txBody>
+          <a:bodyPr lIns="0" rIns="0" tIns="91440" bIns="91440" anchor="t">
             <a:noAutofit/>
           </a:bodyPr>
           <a:p>
@@ -6833,6 +7039,9 @@
                 <a:spcPts val="1599"/>
               </a:spcAft>
               <a:buNone/>
+              <a:tabLst>
+                <a:tab algn="l" pos="0"/>
+              </a:tabLst>
             </a:pPr>
             <a:r>
               <a:rPr b="0" lang="it" sz="1800" spc="-1" strike="noStrike">
@@ -6860,6 +7069,9 @@
                 <a:spcPts val="1599"/>
               </a:spcAft>
               <a:buNone/>
+              <a:tabLst>
+                <a:tab algn="l" pos="0"/>
+              </a:tabLst>
             </a:pPr>
             <a:r>
               <a:rPr b="0" lang="it" sz="1800" spc="-1" strike="noStrike">
@@ -6927,18 +7139,18 @@
         <p:spPr>
           <a:xfrm>
             <a:off x="471960" y="738720"/>
-            <a:ext cx="8221680" cy="767160"/>
-          </a:xfrm>
-          <a:prstGeom prst="rect">
-            <a:avLst/>
-          </a:prstGeom>
-          <a:noFill/>
-          <a:ln w="0">
-            <a:noFill/>
-          </a:ln>
-        </p:spPr>
-        <p:txBody>
-          <a:bodyPr tIns="91440" bIns="91440" anchor="b">
+            <a:ext cx="8221320" cy="766800"/>
+          </a:xfrm>
+          <a:prstGeom prst="rect">
+            <a:avLst/>
+          </a:prstGeom>
+          <a:noFill/>
+          <a:ln w="0">
+            <a:noFill/>
+          </a:ln>
+        </p:spPr>
+        <p:txBody>
+          <a:bodyPr lIns="0" rIns="0" tIns="91440" bIns="91440" anchor="b">
             <a:noAutofit/>
           </a:bodyPr>
           <a:p>
@@ -6947,6 +7159,9 @@
                 <a:spcPct val="100000"/>
               </a:lnSpc>
               <a:buNone/>
+              <a:tabLst>
+                <a:tab algn="l" pos="0"/>
+              </a:tabLst>
             </a:pPr>
             <a:r>
               <a:rPr b="0" lang="it" sz="3200" spc="-1" strike="noStrike">
@@ -6980,18 +7195,18 @@
         <p:spPr>
           <a:xfrm>
             <a:off x="471960" y="1919160"/>
-            <a:ext cx="8221680" cy="2709720"/>
-          </a:xfrm>
-          <a:prstGeom prst="rect">
-            <a:avLst/>
-          </a:prstGeom>
-          <a:noFill/>
-          <a:ln w="0">
-            <a:noFill/>
-          </a:ln>
-        </p:spPr>
-        <p:txBody>
-          <a:bodyPr tIns="91440" bIns="91440" anchor="t">
+            <a:ext cx="8221320" cy="2709360"/>
+          </a:xfrm>
+          <a:prstGeom prst="rect">
+            <a:avLst/>
+          </a:prstGeom>
+          <a:noFill/>
+          <a:ln w="0">
+            <a:noFill/>
+          </a:ln>
+        </p:spPr>
+        <p:txBody>
+          <a:bodyPr lIns="0" rIns="0" tIns="91440" bIns="91440" anchor="t">
             <a:noAutofit/>
           </a:bodyPr>
           <a:p>
@@ -7003,10 +7218,9 @@
             </a:pPr>
             <a:endParaRPr b="0" lang="it-IT" sz="1800" spc="-1" strike="noStrike">
               <a:solidFill>
-                <a:schemeClr val="lt2"/>
-              </a:solidFill>
-              <a:latin typeface="Roboto"/>
-              <a:ea typeface="Roboto"/>
+                <a:srgbClr val="000000"/>
+              </a:solidFill>
+              <a:latin typeface="Arial"/>
             </a:endParaRPr>
           </a:p>
         </p:txBody>
@@ -7024,7 +7238,7 @@
         <p:spPr>
           <a:xfrm>
             <a:off x="2357280" y="1919160"/>
-            <a:ext cx="4428720" cy="2657160"/>
+            <a:ext cx="4428360" cy="2656800"/>
           </a:xfrm>
           <a:prstGeom prst="rect">
             <a:avLst/>
@@ -7036,6 +7250,14 @@
       </p:pic>
     </p:spTree>
   </p:cSld>
+  <mc:AlternateContent>
+    <mc:Choice Requires="p14">
+      <p:transition spd="slow" p14:dur="2000"/>
+    </mc:Choice>
+    <mc:Fallback>
+      <p:transition spd="slow"/>
+    </mc:Fallback>
+  </mc:AlternateContent>
 </p:sld>
 </file>
 
@@ -7069,18 +7291,18 @@
         <p:spPr>
           <a:xfrm>
             <a:off x="471960" y="738720"/>
-            <a:ext cx="8221680" cy="767160"/>
-          </a:xfrm>
-          <a:prstGeom prst="rect">
-            <a:avLst/>
-          </a:prstGeom>
-          <a:noFill/>
-          <a:ln w="0">
-            <a:noFill/>
-          </a:ln>
-        </p:spPr>
-        <p:txBody>
-          <a:bodyPr tIns="91440" bIns="91440" anchor="b">
+            <a:ext cx="8221320" cy="766800"/>
+          </a:xfrm>
+          <a:prstGeom prst="rect">
+            <a:avLst/>
+          </a:prstGeom>
+          <a:noFill/>
+          <a:ln w="0">
+            <a:noFill/>
+          </a:ln>
+        </p:spPr>
+        <p:txBody>
+          <a:bodyPr lIns="0" rIns="0" tIns="91440" bIns="91440" anchor="b">
             <a:noAutofit/>
           </a:bodyPr>
           <a:p>
@@ -7089,6 +7311,9 @@
                 <a:spcPct val="100000"/>
               </a:lnSpc>
               <a:buNone/>
+              <a:tabLst>
+                <a:tab algn="l" pos="0"/>
+              </a:tabLst>
             </a:pPr>
             <a:r>
               <a:rPr b="0" lang="it" sz="3200" spc="-1" strike="noStrike">
@@ -7122,18 +7347,18 @@
         <p:spPr>
           <a:xfrm>
             <a:off x="2681280" y="1821240"/>
-            <a:ext cx="6264360" cy="3091320"/>
-          </a:xfrm>
-          <a:prstGeom prst="rect">
-            <a:avLst/>
-          </a:prstGeom>
-          <a:noFill/>
-          <a:ln w="0">
-            <a:noFill/>
-          </a:ln>
-        </p:spPr>
-        <p:txBody>
-          <a:bodyPr tIns="91440" bIns="91440" anchor="t">
+            <a:ext cx="6264000" cy="3090960"/>
+          </a:xfrm>
+          <a:prstGeom prst="rect">
+            <a:avLst/>
+          </a:prstGeom>
+          <a:noFill/>
+          <a:ln w="0">
+            <a:noFill/>
+          </a:ln>
+        </p:spPr>
+        <p:txBody>
+          <a:bodyPr lIns="0" rIns="0" tIns="91440" bIns="91440" anchor="t">
             <a:noAutofit/>
           </a:bodyPr>
           <a:p>
@@ -7142,6 +7367,9 @@
                 <a:spcPct val="100000"/>
               </a:lnSpc>
               <a:buNone/>
+              <a:tabLst>
+                <a:tab algn="l" pos="0"/>
+              </a:tabLst>
             </a:pPr>
             <a:r>
               <a:rPr b="0" lang="it" sz="1800" spc="-1" strike="noStrike">
@@ -7166,6 +7394,9 @@
                 <a:spcPct val="100000"/>
               </a:lnSpc>
               <a:buNone/>
+              <a:tabLst>
+                <a:tab algn="l" pos="0"/>
+              </a:tabLst>
             </a:pPr>
             <a:endParaRPr b="0" lang="it-IT" sz="1800" spc="-1" strike="noStrike">
               <a:solidFill>
@@ -7180,6 +7411,9 @@
                 <a:spcPct val="100000"/>
               </a:lnSpc>
               <a:buNone/>
+              <a:tabLst>
+                <a:tab algn="l" pos="0"/>
+              </a:tabLst>
             </a:pPr>
             <a:r>
               <a:rPr b="0" lang="it" sz="1800" spc="-1" strike="noStrike">
@@ -7204,6 +7438,9 @@
                 <a:spcPct val="100000"/>
               </a:lnSpc>
               <a:buNone/>
+              <a:tabLst>
+                <a:tab algn="l" pos="0"/>
+              </a:tabLst>
             </a:pPr>
             <a:r>
               <a:rPr b="0" lang="it" sz="1800" spc="-1" strike="noStrike">
@@ -7228,6 +7465,9 @@
                 <a:spcPct val="100000"/>
               </a:lnSpc>
               <a:buNone/>
+              <a:tabLst>
+                <a:tab algn="l" pos="0"/>
+              </a:tabLst>
             </a:pPr>
             <a:r>
               <a:rPr b="0" lang="it" sz="1800" spc="-1" strike="noStrike">
@@ -7252,6 +7492,9 @@
                 <a:spcPct val="100000"/>
               </a:lnSpc>
               <a:buNone/>
+              <a:tabLst>
+                <a:tab algn="l" pos="0"/>
+              </a:tabLst>
             </a:pPr>
             <a:endParaRPr b="0" lang="it-IT" sz="1800" spc="-1" strike="noStrike">
               <a:solidFill>
@@ -7266,6 +7509,9 @@
                 <a:spcPct val="100000"/>
               </a:lnSpc>
               <a:buNone/>
+              <a:tabLst>
+                <a:tab algn="l" pos="0"/>
+              </a:tabLst>
             </a:pPr>
             <a:r>
               <a:rPr b="0" lang="it" sz="1800" spc="-1" strike="noStrike">
@@ -7290,6 +7536,9 @@
                 <a:spcPct val="100000"/>
               </a:lnSpc>
               <a:buNone/>
+              <a:tabLst>
+                <a:tab algn="l" pos="0"/>
+              </a:tabLst>
             </a:pPr>
             <a:endParaRPr b="0" lang="it-IT" sz="1800" spc="-1" strike="noStrike">
               <a:solidFill>
@@ -7304,6 +7553,9 @@
                 <a:spcPct val="100000"/>
               </a:lnSpc>
               <a:buNone/>
+              <a:tabLst>
+                <a:tab algn="l" pos="0"/>
+              </a:tabLst>
             </a:pPr>
             <a:r>
               <a:rPr b="0" lang="it" sz="1800" spc="-1" strike="noStrike">
@@ -7337,7 +7589,7 @@
         <p:spPr>
           <a:xfrm>
             <a:off x="397440" y="1821240"/>
-            <a:ext cx="2060640" cy="3091320"/>
+            <a:ext cx="2060280" cy="3090960"/>
           </a:xfrm>
           <a:prstGeom prst="rect">
             <a:avLst/>
@@ -7349,6 +7601,14 @@
       </p:pic>
     </p:spTree>
   </p:cSld>
+  <mc:AlternateContent>
+    <mc:Choice Requires="p14">
+      <p:transition spd="slow" p14:dur="2000"/>
+    </mc:Choice>
+    <mc:Fallback>
+      <p:transition spd="slow"/>
+    </mc:Fallback>
+  </mc:AlternateContent>
 </p:sld>
 </file>
 
@@ -7382,18 +7642,18 @@
         <p:spPr>
           <a:xfrm>
             <a:off x="471960" y="738720"/>
-            <a:ext cx="8221680" cy="767160"/>
-          </a:xfrm>
-          <a:prstGeom prst="rect">
-            <a:avLst/>
-          </a:prstGeom>
-          <a:noFill/>
-          <a:ln w="0">
-            <a:noFill/>
-          </a:ln>
-        </p:spPr>
-        <p:txBody>
-          <a:bodyPr tIns="91440" bIns="91440" anchor="b">
+            <a:ext cx="8221320" cy="766800"/>
+          </a:xfrm>
+          <a:prstGeom prst="rect">
+            <a:avLst/>
+          </a:prstGeom>
+          <a:noFill/>
+          <a:ln w="0">
+            <a:noFill/>
+          </a:ln>
+        </p:spPr>
+        <p:txBody>
+          <a:bodyPr lIns="0" rIns="0" tIns="91440" bIns="91440" anchor="b">
             <a:noAutofit/>
           </a:bodyPr>
           <a:p>
@@ -7402,6 +7662,9 @@
                 <a:spcPct val="100000"/>
               </a:lnSpc>
               <a:buNone/>
+              <a:tabLst>
+                <a:tab algn="l" pos="0"/>
+              </a:tabLst>
             </a:pPr>
             <a:r>
               <a:rPr b="0" lang="it" sz="3200" spc="-1" strike="noStrike">
@@ -7435,18 +7698,18 @@
         <p:spPr>
           <a:xfrm>
             <a:off x="3653280" y="1919160"/>
-            <a:ext cx="5040360" cy="2709720"/>
-          </a:xfrm>
-          <a:prstGeom prst="rect">
-            <a:avLst/>
-          </a:prstGeom>
-          <a:noFill/>
-          <a:ln w="0">
-            <a:noFill/>
-          </a:ln>
-        </p:spPr>
-        <p:txBody>
-          <a:bodyPr tIns="91440" bIns="91440" anchor="ctr">
+            <a:ext cx="5040000" cy="2709360"/>
+          </a:xfrm>
+          <a:prstGeom prst="rect">
+            <a:avLst/>
+          </a:prstGeom>
+          <a:noFill/>
+          <a:ln w="0">
+            <a:noFill/>
+          </a:ln>
+        </p:spPr>
+        <p:txBody>
+          <a:bodyPr lIns="0" rIns="0" tIns="91440" bIns="91440" anchor="ctr">
             <a:noAutofit/>
           </a:bodyPr>
           <a:p>
@@ -7458,6 +7721,9 @@
                 <a:spcPts val="1599"/>
               </a:spcAft>
               <a:buNone/>
+              <a:tabLst>
+                <a:tab algn="l" pos="0"/>
+              </a:tabLst>
             </a:pPr>
             <a:r>
               <a:rPr b="0" lang="it" sz="3600" spc="-1" strike="noStrike">
@@ -7485,6 +7751,9 @@
                 <a:spcPts val="1599"/>
               </a:spcAft>
               <a:buNone/>
+              <a:tabLst>
+                <a:tab algn="l" pos="0"/>
+              </a:tabLst>
             </a:pPr>
             <a:r>
               <a:rPr b="0" lang="it" sz="3600" spc="-1" strike="noStrike">
@@ -7494,7 +7763,7 @@
                 <a:latin typeface="Roboto"/>
                 <a:ea typeface="Roboto"/>
               </a:rPr>
-              <a:t>http://www.baccan.it</a:t>
+              <a:t>https://www.baccan.it</a:t>
             </a:r>
             <a:endParaRPr b="0" lang="it-IT" sz="3600" spc="-1" strike="noStrike">
               <a:solidFill>
@@ -7518,7 +7787,7 @@
         <p:spPr>
           <a:xfrm>
             <a:off x="690120" y="1821960"/>
-            <a:ext cx="2131560" cy="3197880"/>
+            <a:ext cx="2131200" cy="3197520"/>
           </a:xfrm>
           <a:prstGeom prst="rect">
             <a:avLst/>
@@ -7530,6 +7799,14 @@
       </p:pic>
     </p:spTree>
   </p:cSld>
+  <mc:AlternateContent>
+    <mc:Choice Requires="p14">
+      <p:transition spd="slow" p14:dur="2000"/>
+    </mc:Choice>
+    <mc:Fallback>
+      <p:transition spd="slow"/>
+    </mc:Fallback>
+  </mc:AlternateContent>
 </p:sld>
 </file>
 
@@ -7563,18 +7840,18 @@
         <p:spPr>
           <a:xfrm>
             <a:off x="471960" y="738720"/>
-            <a:ext cx="8221680" cy="767160"/>
-          </a:xfrm>
-          <a:prstGeom prst="rect">
-            <a:avLst/>
-          </a:prstGeom>
-          <a:noFill/>
-          <a:ln w="0">
-            <a:noFill/>
-          </a:ln>
-        </p:spPr>
-        <p:txBody>
-          <a:bodyPr tIns="91440" bIns="91440" anchor="b">
+            <a:ext cx="8221320" cy="766800"/>
+          </a:xfrm>
+          <a:prstGeom prst="rect">
+            <a:avLst/>
+          </a:prstGeom>
+          <a:noFill/>
+          <a:ln w="0">
+            <a:noFill/>
+          </a:ln>
+        </p:spPr>
+        <p:txBody>
+          <a:bodyPr lIns="0" rIns="0" tIns="91440" bIns="91440" anchor="b">
             <a:noAutofit/>
           </a:bodyPr>
           <a:p>
@@ -7583,6 +7860,9 @@
                 <a:spcPct val="100000"/>
               </a:lnSpc>
               <a:buNone/>
+              <a:tabLst>
+                <a:tab algn="l" pos="0"/>
+              </a:tabLst>
             </a:pPr>
             <a:r>
               <a:rPr b="0" lang="it" sz="3200" spc="-1" strike="noStrike">
@@ -7616,18 +7896,18 @@
         <p:spPr>
           <a:xfrm>
             <a:off x="471960" y="1919160"/>
-            <a:ext cx="8221680" cy="2709720"/>
-          </a:xfrm>
-          <a:prstGeom prst="rect">
-            <a:avLst/>
-          </a:prstGeom>
-          <a:noFill/>
-          <a:ln w="0">
-            <a:noFill/>
-          </a:ln>
-        </p:spPr>
-        <p:txBody>
-          <a:bodyPr tIns="91440" bIns="91440" anchor="t">
+            <a:ext cx="8221320" cy="2709360"/>
+          </a:xfrm>
+          <a:prstGeom prst="rect">
+            <a:avLst/>
+          </a:prstGeom>
+          <a:noFill/>
+          <a:ln w="0">
+            <a:noFill/>
+          </a:ln>
+        </p:spPr>
+        <p:txBody>
+          <a:bodyPr lIns="0" rIns="0" tIns="91440" bIns="91440" anchor="t">
             <a:noAutofit/>
           </a:bodyPr>
           <a:p>
@@ -7639,6 +7919,9 @@
                 <a:spcPts val="1599"/>
               </a:spcAft>
               <a:buNone/>
+              <a:tabLst>
+                <a:tab algn="l" pos="0"/>
+              </a:tabLst>
             </a:pPr>
             <a:r>
               <a:rPr b="0" lang="it" sz="1800" spc="-1" strike="noStrike">
@@ -7666,6 +7949,9 @@
                 <a:spcPts val="1599"/>
               </a:spcAft>
               <a:buNone/>
+              <a:tabLst>
+                <a:tab algn="l" pos="0"/>
+              </a:tabLst>
             </a:pPr>
             <a:r>
               <a:rPr b="0" lang="it" sz="1800" spc="-1" strike="noStrike">
@@ -7693,6 +7979,9 @@
                 <a:spcPts val="1599"/>
               </a:spcAft>
               <a:buNone/>
+              <a:tabLst>
+                <a:tab algn="l" pos="0"/>
+              </a:tabLst>
             </a:pPr>
             <a:r>
               <a:rPr b="0" lang="it" sz="1800" spc="-1" strike="noStrike">
@@ -7720,6 +8009,9 @@
                 <a:spcPts val="1599"/>
               </a:spcAft>
               <a:buNone/>
+              <a:tabLst>
+                <a:tab algn="l" pos="0"/>
+              </a:tabLst>
             </a:pPr>
             <a:r>
               <a:rPr b="0" lang="it" sz="1800" spc="-1" strike="noStrike">
@@ -7747,6 +8039,9 @@
                 <a:spcPts val="1599"/>
               </a:spcAft>
               <a:buNone/>
+              <a:tabLst>
+                <a:tab algn="l" pos="0"/>
+              </a:tabLst>
             </a:pPr>
             <a:r>
               <a:rPr b="0" lang="it" sz="1800" spc="-1" strike="noStrike">
@@ -7769,6 +8064,14 @@
       </p:sp>
     </p:spTree>
   </p:cSld>
+  <mc:AlternateContent>
+    <mc:Choice Requires="p14">
+      <p:transition spd="slow" p14:dur="2000"/>
+    </mc:Choice>
+    <mc:Fallback>
+      <p:transition spd="slow"/>
+    </mc:Fallback>
+  </mc:AlternateContent>
 </p:sld>
 </file>
 
@@ -7802,18 +8105,18 @@
         <p:spPr>
           <a:xfrm>
             <a:off x="471960" y="738720"/>
-            <a:ext cx="8221680" cy="767160"/>
-          </a:xfrm>
-          <a:prstGeom prst="rect">
-            <a:avLst/>
-          </a:prstGeom>
-          <a:noFill/>
-          <a:ln w="0">
-            <a:noFill/>
-          </a:ln>
-        </p:spPr>
-        <p:txBody>
-          <a:bodyPr tIns="91440" bIns="91440" anchor="b">
+            <a:ext cx="8221320" cy="766800"/>
+          </a:xfrm>
+          <a:prstGeom prst="rect">
+            <a:avLst/>
+          </a:prstGeom>
+          <a:noFill/>
+          <a:ln w="0">
+            <a:noFill/>
+          </a:ln>
+        </p:spPr>
+        <p:txBody>
+          <a:bodyPr lIns="0" rIns="0" tIns="91440" bIns="91440" anchor="b">
             <a:noAutofit/>
           </a:bodyPr>
           <a:p>
@@ -7822,6 +8125,9 @@
                 <a:spcPct val="100000"/>
               </a:lnSpc>
               <a:buNone/>
+              <a:tabLst>
+                <a:tab algn="l" pos="0"/>
+              </a:tabLst>
             </a:pPr>
             <a:r>
               <a:rPr b="0" lang="it" sz="3200" spc="-1" strike="noStrike">
@@ -7855,18 +8161,18 @@
         <p:spPr>
           <a:xfrm>
             <a:off x="471960" y="1919160"/>
-            <a:ext cx="8221680" cy="2709720"/>
-          </a:xfrm>
-          <a:prstGeom prst="rect">
-            <a:avLst/>
-          </a:prstGeom>
-          <a:noFill/>
-          <a:ln w="0">
-            <a:noFill/>
-          </a:ln>
-        </p:spPr>
-        <p:txBody>
-          <a:bodyPr tIns="91440" bIns="91440" anchor="t">
+            <a:ext cx="8221320" cy="2709360"/>
+          </a:xfrm>
+          <a:prstGeom prst="rect">
+            <a:avLst/>
+          </a:prstGeom>
+          <a:noFill/>
+          <a:ln w="0">
+            <a:noFill/>
+          </a:ln>
+        </p:spPr>
+        <p:txBody>
+          <a:bodyPr lIns="0" rIns="0" tIns="91440" bIns="91440" anchor="t">
             <a:noAutofit/>
           </a:bodyPr>
           <a:p>
@@ -7878,6 +8184,9 @@
                 <a:spcPts val="1599"/>
               </a:spcAft>
               <a:buNone/>
+              <a:tabLst>
+                <a:tab algn="l" pos="0"/>
+              </a:tabLst>
             </a:pPr>
             <a:r>
               <a:rPr b="0" lang="it" sz="1800" spc="-1" strike="noStrike">
@@ -7905,6 +8214,9 @@
                 <a:spcPts val="1599"/>
               </a:spcAft>
               <a:buNone/>
+              <a:tabLst>
+                <a:tab algn="l" pos="0"/>
+              </a:tabLst>
             </a:pPr>
             <a:r>
               <a:rPr b="0" lang="it" sz="1800" spc="-1" strike="noStrike">
@@ -7932,6 +8244,9 @@
                 <a:spcPts val="1599"/>
               </a:spcAft>
               <a:buNone/>
+              <a:tabLst>
+                <a:tab algn="l" pos="0"/>
+              </a:tabLst>
             </a:pPr>
             <a:r>
               <a:rPr b="0" lang="it" sz="1800" spc="-1" strike="noStrike">
@@ -7954,6 +8269,14 @@
       </p:sp>
     </p:spTree>
   </p:cSld>
+  <mc:AlternateContent>
+    <mc:Choice Requires="p14">
+      <p:transition spd="slow" p14:dur="2000"/>
+    </mc:Choice>
+    <mc:Fallback>
+      <p:transition spd="slow"/>
+    </mc:Fallback>
+  </mc:AlternateContent>
 </p:sld>
 </file>
 
@@ -7987,18 +8310,18 @@
         <p:spPr>
           <a:xfrm>
             <a:off x="471960" y="738720"/>
-            <a:ext cx="8221680" cy="767160"/>
-          </a:xfrm>
-          <a:prstGeom prst="rect">
-            <a:avLst/>
-          </a:prstGeom>
-          <a:noFill/>
-          <a:ln w="0">
-            <a:noFill/>
-          </a:ln>
-        </p:spPr>
-        <p:txBody>
-          <a:bodyPr tIns="91440" bIns="91440" anchor="b">
+            <a:ext cx="8221320" cy="766800"/>
+          </a:xfrm>
+          <a:prstGeom prst="rect">
+            <a:avLst/>
+          </a:prstGeom>
+          <a:noFill/>
+          <a:ln w="0">
+            <a:noFill/>
+          </a:ln>
+        </p:spPr>
+        <p:txBody>
+          <a:bodyPr lIns="0" rIns="0" tIns="91440" bIns="91440" anchor="b">
             <a:noAutofit/>
           </a:bodyPr>
           <a:p>
@@ -8007,6 +8330,9 @@
                 <a:spcPct val="100000"/>
               </a:lnSpc>
               <a:buNone/>
+              <a:tabLst>
+                <a:tab algn="l" pos="0"/>
+              </a:tabLst>
             </a:pPr>
             <a:r>
               <a:rPr b="0" lang="it" sz="3200" spc="-1" strike="noStrike">
@@ -8040,18 +8366,18 @@
         <p:spPr>
           <a:xfrm>
             <a:off x="471960" y="1919160"/>
-            <a:ext cx="8221680" cy="2709720"/>
-          </a:xfrm>
-          <a:prstGeom prst="rect">
-            <a:avLst/>
-          </a:prstGeom>
-          <a:noFill/>
-          <a:ln w="0">
-            <a:noFill/>
-          </a:ln>
-        </p:spPr>
-        <p:txBody>
-          <a:bodyPr tIns="91440" bIns="91440" anchor="t">
+            <a:ext cx="8221320" cy="2709360"/>
+          </a:xfrm>
+          <a:prstGeom prst="rect">
+            <a:avLst/>
+          </a:prstGeom>
+          <a:noFill/>
+          <a:ln w="0">
+            <a:noFill/>
+          </a:ln>
+        </p:spPr>
+        <p:txBody>
+          <a:bodyPr lIns="0" rIns="0" tIns="91440" bIns="91440" anchor="t">
             <a:noAutofit/>
           </a:bodyPr>
           <a:p>
@@ -8063,6 +8389,9 @@
                 <a:spcPts val="1599"/>
               </a:spcAft>
               <a:buNone/>
+              <a:tabLst>
+                <a:tab algn="l" pos="0"/>
+              </a:tabLst>
             </a:pPr>
             <a:r>
               <a:rPr b="0" lang="it" sz="1800" spc="-1" strike="noStrike">
@@ -8090,6 +8419,9 @@
                 <a:spcPts val="1599"/>
               </a:spcAft>
               <a:buNone/>
+              <a:tabLst>
+                <a:tab algn="l" pos="0"/>
+              </a:tabLst>
             </a:pPr>
             <a:r>
               <a:rPr b="0" lang="it" sz="1800" spc="-1" strike="noStrike">
@@ -8117,6 +8449,9 @@
                 <a:spcPts val="1599"/>
               </a:spcAft>
               <a:buNone/>
+              <a:tabLst>
+                <a:tab algn="l" pos="0"/>
+              </a:tabLst>
             </a:pPr>
             <a:r>
               <a:rPr b="0" lang="it" sz="1800" spc="-1" strike="noStrike">
@@ -8144,6 +8479,9 @@
                 <a:spcPts val="1599"/>
               </a:spcAft>
               <a:buNone/>
+              <a:tabLst>
+                <a:tab algn="l" pos="0"/>
+              </a:tabLst>
             </a:pPr>
             <a:r>
               <a:rPr b="0" lang="it" sz="1800" spc="-1" strike="noStrike">
@@ -8166,6 +8504,14 @@
       </p:sp>
     </p:spTree>
   </p:cSld>
+  <mc:AlternateContent>
+    <mc:Choice Requires="p14">
+      <p:transition spd="slow" p14:dur="2000"/>
+    </mc:Choice>
+    <mc:Fallback>
+      <p:transition spd="slow"/>
+    </mc:Fallback>
+  </mc:AlternateContent>
 </p:sld>
 </file>
 
@@ -8199,18 +8545,18 @@
         <p:spPr>
           <a:xfrm>
             <a:off x="471960" y="738720"/>
-            <a:ext cx="8221680" cy="767160"/>
-          </a:xfrm>
-          <a:prstGeom prst="rect">
-            <a:avLst/>
-          </a:prstGeom>
-          <a:noFill/>
-          <a:ln w="0">
-            <a:noFill/>
-          </a:ln>
-        </p:spPr>
-        <p:txBody>
-          <a:bodyPr tIns="91440" bIns="91440" anchor="b">
+            <a:ext cx="8221320" cy="766800"/>
+          </a:xfrm>
+          <a:prstGeom prst="rect">
+            <a:avLst/>
+          </a:prstGeom>
+          <a:noFill/>
+          <a:ln w="0">
+            <a:noFill/>
+          </a:ln>
+        </p:spPr>
+        <p:txBody>
+          <a:bodyPr lIns="0" rIns="0" tIns="91440" bIns="91440" anchor="b">
             <a:noAutofit/>
           </a:bodyPr>
           <a:p>
@@ -8219,6 +8565,9 @@
                 <a:spcPct val="100000"/>
               </a:lnSpc>
               <a:buNone/>
+              <a:tabLst>
+                <a:tab algn="l" pos="0"/>
+              </a:tabLst>
             </a:pPr>
             <a:r>
               <a:rPr b="0" lang="it" sz="3200" spc="-1" strike="noStrike">
@@ -8252,18 +8601,18 @@
         <p:spPr>
           <a:xfrm>
             <a:off x="471960" y="1919160"/>
-            <a:ext cx="8221680" cy="2988720"/>
-          </a:xfrm>
-          <a:prstGeom prst="rect">
-            <a:avLst/>
-          </a:prstGeom>
-          <a:noFill/>
-          <a:ln w="0">
-            <a:noFill/>
-          </a:ln>
-        </p:spPr>
-        <p:txBody>
-          <a:bodyPr tIns="91440" bIns="91440" anchor="t">
+            <a:ext cx="8221320" cy="2988360"/>
+          </a:xfrm>
+          <a:prstGeom prst="rect">
+            <a:avLst/>
+          </a:prstGeom>
+          <a:noFill/>
+          <a:ln w="0">
+            <a:noFill/>
+          </a:ln>
+        </p:spPr>
+        <p:txBody>
+          <a:bodyPr lIns="0" rIns="0" tIns="91440" bIns="91440" anchor="t">
             <a:noAutofit/>
           </a:bodyPr>
           <a:p>
@@ -8275,6 +8624,9 @@
                 <a:spcPts val="1599"/>
               </a:spcAft>
               <a:buNone/>
+              <a:tabLst>
+                <a:tab algn="l" pos="0"/>
+              </a:tabLst>
             </a:pPr>
             <a:r>
               <a:rPr b="0" lang="it" sz="1800" spc="-1" strike="noStrike">
@@ -8412,6 +8764,9 @@
                 <a:spcPts val="1599"/>
               </a:spcAft>
               <a:buNone/>
+              <a:tabLst>
+                <a:tab algn="l" pos="0"/>
+              </a:tabLst>
             </a:pPr>
             <a:r>
               <a:rPr b="0" lang="it" sz="1800" spc="-1" strike="noStrike">
@@ -8502,6 +8857,9 @@
                 <a:spcPts val="1599"/>
               </a:spcAft>
               <a:buNone/>
+              <a:tabLst>
+                <a:tab algn="l" pos="0"/>
+              </a:tabLst>
             </a:pPr>
             <a:r>
               <a:rPr b="0" lang="it" sz="1800" spc="-1" strike="noStrike">
@@ -8524,6 +8882,14 @@
       </p:sp>
     </p:spTree>
   </p:cSld>
+  <mc:AlternateContent>
+    <mc:Choice Requires="p14">
+      <p:transition spd="slow" p14:dur="2000"/>
+    </mc:Choice>
+    <mc:Fallback>
+      <p:transition spd="slow"/>
+    </mc:Fallback>
+  </mc:AlternateContent>
 </p:sld>
 </file>
 
@@ -8557,18 +8923,18 @@
         <p:spPr>
           <a:xfrm>
             <a:off x="471960" y="738720"/>
-            <a:ext cx="8221680" cy="767160"/>
-          </a:xfrm>
-          <a:prstGeom prst="rect">
-            <a:avLst/>
-          </a:prstGeom>
-          <a:noFill/>
-          <a:ln w="0">
-            <a:noFill/>
-          </a:ln>
-        </p:spPr>
-        <p:txBody>
-          <a:bodyPr tIns="91440" bIns="91440" anchor="b">
+            <a:ext cx="8221320" cy="766800"/>
+          </a:xfrm>
+          <a:prstGeom prst="rect">
+            <a:avLst/>
+          </a:prstGeom>
+          <a:noFill/>
+          <a:ln w="0">
+            <a:noFill/>
+          </a:ln>
+        </p:spPr>
+        <p:txBody>
+          <a:bodyPr lIns="0" rIns="0" tIns="91440" bIns="91440" anchor="b">
             <a:noAutofit/>
           </a:bodyPr>
           <a:p>
@@ -8577,6 +8943,9 @@
                 <a:spcPct val="100000"/>
               </a:lnSpc>
               <a:buNone/>
+              <a:tabLst>
+                <a:tab algn="l" pos="0"/>
+              </a:tabLst>
             </a:pPr>
             <a:r>
               <a:rPr b="0" lang="it" sz="3200" spc="-1" strike="noStrike">
@@ -8610,18 +8979,18 @@
         <p:spPr>
           <a:xfrm>
             <a:off x="471960" y="1919160"/>
-            <a:ext cx="8221680" cy="2988720"/>
-          </a:xfrm>
-          <a:prstGeom prst="rect">
-            <a:avLst/>
-          </a:prstGeom>
-          <a:noFill/>
-          <a:ln w="0">
-            <a:noFill/>
-          </a:ln>
-        </p:spPr>
-        <p:txBody>
-          <a:bodyPr tIns="91440" bIns="91440" anchor="t">
+            <a:ext cx="8221320" cy="2988360"/>
+          </a:xfrm>
+          <a:prstGeom prst="rect">
+            <a:avLst/>
+          </a:prstGeom>
+          <a:noFill/>
+          <a:ln w="0">
+            <a:noFill/>
+          </a:ln>
+        </p:spPr>
+        <p:txBody>
+          <a:bodyPr lIns="0" rIns="0" tIns="91440" bIns="91440" anchor="t">
             <a:noAutofit/>
           </a:bodyPr>
           <a:p>
@@ -8633,6 +9002,9 @@
                 <a:spcPts val="1599"/>
               </a:spcAft>
               <a:buNone/>
+              <a:tabLst>
+                <a:tab algn="l" pos="0"/>
+              </a:tabLst>
             </a:pPr>
             <a:r>
               <a:rPr b="0" lang="it" sz="1800" spc="-1" strike="noStrike">
@@ -8660,6 +9032,9 @@
                 <a:spcPts val="1599"/>
               </a:spcAft>
               <a:buNone/>
+              <a:tabLst>
+                <a:tab algn="l" pos="0"/>
+              </a:tabLst>
             </a:pPr>
             <a:r>
               <a:rPr b="0" lang="it" sz="1800" spc="-1" strike="noStrike">
@@ -8687,6 +9062,9 @@
                 <a:spcPts val="1599"/>
               </a:spcAft>
               <a:buNone/>
+              <a:tabLst>
+                <a:tab algn="l" pos="0"/>
+              </a:tabLst>
             </a:pPr>
             <a:r>
               <a:rPr b="0" lang="it" sz="1800" spc="-1" strike="noStrike">
@@ -8714,6 +9092,9 @@
                 <a:spcPts val="1599"/>
               </a:spcAft>
               <a:buNone/>
+              <a:tabLst>
+                <a:tab algn="l" pos="0"/>
+              </a:tabLst>
             </a:pPr>
             <a:r>
               <a:rPr b="0" lang="it" sz="1800" spc="-1" strike="noStrike">
@@ -8741,6 +9122,9 @@
                 <a:spcPts val="1599"/>
               </a:spcAft>
               <a:buNone/>
+              <a:tabLst>
+                <a:tab algn="l" pos="0"/>
+              </a:tabLst>
             </a:pPr>
             <a:r>
               <a:rPr b="0" lang="it" sz="1800" spc="-1" strike="noStrike">
@@ -8768,6 +9152,9 @@
                 <a:spcPts val="1599"/>
               </a:spcAft>
               <a:buNone/>
+              <a:tabLst>
+                <a:tab algn="l" pos="0"/>
+              </a:tabLst>
             </a:pPr>
             <a:r>
               <a:rPr b="0" lang="it" sz="1800" spc="-1" strike="noStrike">
@@ -8795,6 +9182,9 @@
                 <a:spcPts val="1599"/>
               </a:spcAft>
               <a:buNone/>
+              <a:tabLst>
+                <a:tab algn="l" pos="0"/>
+              </a:tabLst>
             </a:pPr>
             <a:endParaRPr b="0" lang="it-IT" sz="1800" spc="-1" strike="noStrike">
               <a:solidFill>
@@ -8807,6 +9197,14 @@
       </p:sp>
     </p:spTree>
   </p:cSld>
+  <mc:AlternateContent>
+    <mc:Choice Requires="p14">
+      <p:transition spd="slow" p14:dur="2000"/>
+    </mc:Choice>
+    <mc:Fallback>
+      <p:transition spd="slow"/>
+    </mc:Fallback>
+  </mc:AlternateContent>
 </p:sld>
 </file>
 
@@ -8840,18 +9238,18 @@
         <p:spPr>
           <a:xfrm>
             <a:off x="471960" y="738720"/>
-            <a:ext cx="8221680" cy="767160"/>
-          </a:xfrm>
-          <a:prstGeom prst="rect">
-            <a:avLst/>
-          </a:prstGeom>
-          <a:noFill/>
-          <a:ln w="0">
-            <a:noFill/>
-          </a:ln>
-        </p:spPr>
-        <p:txBody>
-          <a:bodyPr tIns="91440" bIns="91440" anchor="b">
+            <a:ext cx="8221320" cy="766800"/>
+          </a:xfrm>
+          <a:prstGeom prst="rect">
+            <a:avLst/>
+          </a:prstGeom>
+          <a:noFill/>
+          <a:ln w="0">
+            <a:noFill/>
+          </a:ln>
+        </p:spPr>
+        <p:txBody>
+          <a:bodyPr lIns="0" rIns="0" tIns="91440" bIns="91440" anchor="b">
             <a:noAutofit/>
           </a:bodyPr>
           <a:p>
@@ -8860,6 +9258,9 @@
                 <a:spcPct val="100000"/>
               </a:lnSpc>
               <a:buNone/>
+              <a:tabLst>
+                <a:tab algn="l" pos="0"/>
+              </a:tabLst>
             </a:pPr>
             <a:r>
               <a:rPr b="0" lang="it" sz="3200" spc="-1" strike="noStrike">
@@ -8893,18 +9294,18 @@
         <p:spPr>
           <a:xfrm>
             <a:off x="471960" y="1919160"/>
-            <a:ext cx="8221680" cy="2988720"/>
-          </a:xfrm>
-          <a:prstGeom prst="rect">
-            <a:avLst/>
-          </a:prstGeom>
-          <a:noFill/>
-          <a:ln w="0">
-            <a:noFill/>
-          </a:ln>
-        </p:spPr>
-        <p:txBody>
-          <a:bodyPr tIns="91440" bIns="91440" anchor="t">
+            <a:ext cx="8221320" cy="2988360"/>
+          </a:xfrm>
+          <a:prstGeom prst="rect">
+            <a:avLst/>
+          </a:prstGeom>
+          <a:noFill/>
+          <a:ln w="0">
+            <a:noFill/>
+          </a:ln>
+        </p:spPr>
+        <p:txBody>
+          <a:bodyPr lIns="0" rIns="0" tIns="91440" bIns="91440" anchor="t">
             <a:noAutofit/>
           </a:bodyPr>
           <a:p>
@@ -8916,6 +9317,9 @@
                 <a:spcPts val="1599"/>
               </a:spcAft>
               <a:buNone/>
+              <a:tabLst>
+                <a:tab algn="l" pos="0"/>
+              </a:tabLst>
             </a:pPr>
             <a:endParaRPr b="0" lang="it-IT" sz="1000" spc="-1" strike="noStrike">
               <a:solidFill>
@@ -8933,6 +9337,9 @@
                 <a:spcPts val="1599"/>
               </a:spcAft>
               <a:buNone/>
+              <a:tabLst>
+                <a:tab algn="l" pos="0"/>
+              </a:tabLst>
             </a:pPr>
             <a:r>
               <a:rPr b="0" lang="it" sz="4800" spc="-1" strike="noStrike">
@@ -8955,6 +9362,14 @@
       </p:sp>
     </p:spTree>
   </p:cSld>
+  <mc:AlternateContent>
+    <mc:Choice Requires="p14">
+      <p:transition spd="slow" p14:dur="2000"/>
+    </mc:Choice>
+    <mc:Fallback>
+      <p:transition spd="slow"/>
+    </mc:Fallback>
+  </mc:AlternateContent>
 </p:sld>
 </file>
 
@@ -8988,18 +9403,18 @@
         <p:spPr>
           <a:xfrm>
             <a:off x="471960" y="738720"/>
-            <a:ext cx="8221680" cy="767160"/>
-          </a:xfrm>
-          <a:prstGeom prst="rect">
-            <a:avLst/>
-          </a:prstGeom>
-          <a:noFill/>
-          <a:ln w="0">
-            <a:noFill/>
-          </a:ln>
-        </p:spPr>
-        <p:txBody>
-          <a:bodyPr tIns="91440" bIns="91440" anchor="b">
+            <a:ext cx="8221320" cy="766800"/>
+          </a:xfrm>
+          <a:prstGeom prst="rect">
+            <a:avLst/>
+          </a:prstGeom>
+          <a:noFill/>
+          <a:ln w="0">
+            <a:noFill/>
+          </a:ln>
+        </p:spPr>
+        <p:txBody>
+          <a:bodyPr lIns="0" rIns="0" tIns="91440" bIns="91440" anchor="b">
             <a:noAutofit/>
           </a:bodyPr>
           <a:p>
@@ -9008,6 +9423,9 @@
                 <a:spcPct val="100000"/>
               </a:lnSpc>
               <a:buNone/>
+              <a:tabLst>
+                <a:tab algn="l" pos="0"/>
+              </a:tabLst>
             </a:pPr>
             <a:r>
               <a:rPr b="0" lang="it" sz="3200" spc="-1" strike="noStrike">
@@ -9041,18 +9459,18 @@
         <p:spPr>
           <a:xfrm>
             <a:off x="471960" y="1919160"/>
-            <a:ext cx="8221680" cy="2709720"/>
-          </a:xfrm>
-          <a:prstGeom prst="rect">
-            <a:avLst/>
-          </a:prstGeom>
-          <a:noFill/>
-          <a:ln w="0">
-            <a:noFill/>
-          </a:ln>
-        </p:spPr>
-        <p:txBody>
-          <a:bodyPr tIns="91440" bIns="91440" anchor="t">
+            <a:ext cx="8221320" cy="2709360"/>
+          </a:xfrm>
+          <a:prstGeom prst="rect">
+            <a:avLst/>
+          </a:prstGeom>
+          <a:noFill/>
+          <a:ln w="0">
+            <a:noFill/>
+          </a:ln>
+        </p:spPr>
+        <p:txBody>
+          <a:bodyPr lIns="0" rIns="0" tIns="91440" bIns="91440" anchor="t">
             <a:noAutofit/>
           </a:bodyPr>
           <a:p>
@@ -9064,6 +9482,9 @@
                 <a:spcPts val="1599"/>
               </a:spcAft>
               <a:buNone/>
+              <a:tabLst>
+                <a:tab algn="l" pos="0"/>
+              </a:tabLst>
             </a:pPr>
             <a:r>
               <a:rPr b="0" lang="it" sz="1800" spc="-1" strike="noStrike">
@@ -9091,6 +9512,9 @@
                 <a:spcPts val="1599"/>
               </a:spcAft>
               <a:buNone/>
+              <a:tabLst>
+                <a:tab algn="l" pos="0"/>
+              </a:tabLst>
             </a:pPr>
             <a:r>
               <a:rPr b="0" lang="it" sz="1800" spc="-1" strike="noStrike">
@@ -9118,6 +9542,9 @@
                 <a:spcPts val="1599"/>
               </a:spcAft>
               <a:buNone/>
+              <a:tabLst>
+                <a:tab algn="l" pos="0"/>
+              </a:tabLst>
             </a:pPr>
             <a:r>
               <a:rPr b="0" lang="it" sz="1800" spc="-1" strike="noStrike">
@@ -9145,6 +9572,9 @@
                 <a:spcPts val="1599"/>
               </a:spcAft>
               <a:buNone/>
+              <a:tabLst>
+                <a:tab algn="l" pos="0"/>
+              </a:tabLst>
             </a:pPr>
             <a:r>
               <a:rPr b="0" lang="it" sz="1800" spc="-1" strike="noStrike">
@@ -9167,6 +9597,14 @@
       </p:sp>
     </p:spTree>
   </p:cSld>
+  <mc:AlternateContent>
+    <mc:Choice Requires="p14">
+      <p:transition spd="slow" p14:dur="2000"/>
+    </mc:Choice>
+    <mc:Fallback>
+      <p:transition spd="slow"/>
+    </mc:Fallback>
+  </mc:AlternateContent>
 </p:sld>
 </file>
 

</xml_diff>